<commit_message>
new file:   Images/Cat.png 	new file:   Images/Image1.jpg 	modified:   "Presentaci\303\263n1.pptx" 	new file:   Readme.md
</commit_message>
<xml_diff>
--- a/Presentación1.pptx
+++ b/Presentación1.pptx
@@ -5,9 +5,10 @@
     <p:sldMasterId id="2147483648" r:id="rId1"/>
   </p:sldMasterIdLst>
   <p:sldIdLst>
-    <p:sldId id="256" r:id="rId2"/>
+    <p:sldId id="257" r:id="rId2"/>
+    <p:sldId id="258" r:id="rId3"/>
   </p:sldIdLst>
-  <p:sldSz cx="12192000" cy="6858000"/>
+  <p:sldSz cx="9144000" cy="6858000" type="screen4x3"/>
   <p:notesSz cx="6858000" cy="9144000"/>
   <p:defaultTextStyle>
     <a:defPPr>
@@ -104,6 +105,11 @@
       </a:defRPr>
     </a:lvl9pPr>
   </p:defaultTextStyle>
+  <p:extLst>
+    <p:ext uri="{EFAFB233-063F-42B5-8137-9DF3F51BA10A}">
+      <p15:sldGuideLst xmlns:p15="http://schemas.microsoft.com/office/powerpoint/2012/main"/>
+    </p:ext>
+  </p:extLst>
 </p:presentation>
 </file>
 
@@ -142,15 +148,15 @@
         </p:nvSpPr>
         <p:spPr>
           <a:xfrm>
-            <a:off x="1524000" y="1122363"/>
-            <a:ext cx="9144000" cy="2387600"/>
+            <a:off x="1143000" y="1122363"/>
+            <a:ext cx="6858000" cy="2387600"/>
           </a:xfrm>
         </p:spPr>
         <p:txBody>
           <a:bodyPr anchor="b"/>
           <a:lstStyle>
             <a:lvl1pPr algn="ctr">
-              <a:defRPr sz="6000"/>
+              <a:defRPr sz="4500"/>
             </a:lvl1pPr>
           </a:lstStyle>
           <a:p>
@@ -180,8 +186,8 @@
         </p:nvSpPr>
         <p:spPr>
           <a:xfrm>
-            <a:off x="1524000" y="3602038"/>
-            <a:ext cx="9144000" cy="1655762"/>
+            <a:off x="1143000" y="3602038"/>
+            <a:ext cx="6858000" cy="1655762"/>
           </a:xfrm>
         </p:spPr>
         <p:txBody>
@@ -189,39 +195,39 @@
           <a:lstStyle>
             <a:lvl1pPr marL="0" indent="0" algn="ctr">
               <a:buNone/>
-              <a:defRPr sz="2400"/>
+              <a:defRPr sz="1800"/>
             </a:lvl1pPr>
-            <a:lvl2pPr marL="457200" indent="0" algn="ctr">
-              <a:buNone/>
-              <a:defRPr sz="2000"/>
+            <a:lvl2pPr marL="342900" indent="0" algn="ctr">
+              <a:buNone/>
+              <a:defRPr sz="1500"/>
             </a:lvl2pPr>
-            <a:lvl3pPr marL="914400" indent="0" algn="ctr">
-              <a:buNone/>
-              <a:defRPr sz="1800"/>
+            <a:lvl3pPr marL="685800" indent="0" algn="ctr">
+              <a:buNone/>
+              <a:defRPr sz="1350"/>
             </a:lvl3pPr>
-            <a:lvl4pPr marL="1371600" indent="0" algn="ctr">
-              <a:buNone/>
-              <a:defRPr sz="1600"/>
+            <a:lvl4pPr marL="1028700" indent="0" algn="ctr">
+              <a:buNone/>
+              <a:defRPr sz="1200"/>
             </a:lvl4pPr>
-            <a:lvl5pPr marL="1828800" indent="0" algn="ctr">
-              <a:buNone/>
-              <a:defRPr sz="1600"/>
+            <a:lvl5pPr marL="1371600" indent="0" algn="ctr">
+              <a:buNone/>
+              <a:defRPr sz="1200"/>
             </a:lvl5pPr>
-            <a:lvl6pPr marL="2286000" indent="0" algn="ctr">
-              <a:buNone/>
-              <a:defRPr sz="1600"/>
+            <a:lvl6pPr marL="1714500" indent="0" algn="ctr">
+              <a:buNone/>
+              <a:defRPr sz="1200"/>
             </a:lvl6pPr>
-            <a:lvl7pPr marL="2743200" indent="0" algn="ctr">
-              <a:buNone/>
-              <a:defRPr sz="1600"/>
+            <a:lvl7pPr marL="2057400" indent="0" algn="ctr">
+              <a:buNone/>
+              <a:defRPr sz="1200"/>
             </a:lvl7pPr>
-            <a:lvl8pPr marL="3200400" indent="0" algn="ctr">
-              <a:buNone/>
-              <a:defRPr sz="1600"/>
+            <a:lvl8pPr marL="2400300" indent="0" algn="ctr">
+              <a:buNone/>
+              <a:defRPr sz="1200"/>
             </a:lvl8pPr>
-            <a:lvl9pPr marL="3657600" indent="0" algn="ctr">
-              <a:buNone/>
-              <a:defRPr sz="1600"/>
+            <a:lvl9pPr marL="2743200" indent="0" algn="ctr">
+              <a:buNone/>
+              <a:defRPr sz="1200"/>
             </a:lvl9pPr>
           </a:lstStyle>
           <a:p>
@@ -258,7 +264,7 @@
               <a:rPr lang="es-CO" smtClean="0"/>
               <a:t>20/03/2023</a:t>
             </a:fld>
-            <a:endParaRPr lang="es-CO"/>
+            <a:endParaRPr lang="es-CO" dirty="0"/>
           </a:p>
         </p:txBody>
       </p:sp>
@@ -283,7 +289,7 @@
           <a:bodyPr/>
           <a:lstStyle/>
           <a:p>
-            <a:endParaRPr lang="es-CO"/>
+            <a:endParaRPr lang="es-CO" dirty="0"/>
           </a:p>
         </p:txBody>
       </p:sp>
@@ -312,7 +318,7 @@
               <a:rPr lang="es-CO" smtClean="0"/>
               <a:t>‹Nº›</a:t>
             </a:fld>
-            <a:endParaRPr lang="es-CO"/>
+            <a:endParaRPr lang="es-CO" dirty="0"/>
           </a:p>
         </p:txBody>
       </p:sp>
@@ -458,7 +464,7 @@
               <a:rPr lang="es-CO" smtClean="0"/>
               <a:t>20/03/2023</a:t>
             </a:fld>
-            <a:endParaRPr lang="es-CO"/>
+            <a:endParaRPr lang="es-CO" dirty="0"/>
           </a:p>
         </p:txBody>
       </p:sp>
@@ -483,7 +489,7 @@
           <a:bodyPr/>
           <a:lstStyle/>
           <a:p>
-            <a:endParaRPr lang="es-CO"/>
+            <a:endParaRPr lang="es-CO" dirty="0"/>
           </a:p>
         </p:txBody>
       </p:sp>
@@ -512,7 +518,7 @@
               <a:rPr lang="es-CO" smtClean="0"/>
               <a:t>‹Nº›</a:t>
             </a:fld>
-            <a:endParaRPr lang="es-CO"/>
+            <a:endParaRPr lang="es-CO" dirty="0"/>
           </a:p>
         </p:txBody>
       </p:sp>
@@ -564,8 +570,8 @@
         </p:nvSpPr>
         <p:spPr>
           <a:xfrm>
-            <a:off x="8724900" y="365125"/>
-            <a:ext cx="2628900" cy="5811838"/>
+            <a:off x="6543675" y="365125"/>
+            <a:ext cx="1971675" cy="5811838"/>
           </a:xfrm>
         </p:spPr>
         <p:txBody>
@@ -598,8 +604,8 @@
         </p:nvSpPr>
         <p:spPr>
           <a:xfrm>
-            <a:off x="838200" y="365125"/>
-            <a:ext cx="7734300" cy="5811838"/>
+            <a:off x="628650" y="365125"/>
+            <a:ext cx="5800725" cy="5811838"/>
           </a:xfrm>
         </p:spPr>
         <p:txBody>
@@ -668,7 +674,7 @@
               <a:rPr lang="es-CO" smtClean="0"/>
               <a:t>20/03/2023</a:t>
             </a:fld>
-            <a:endParaRPr lang="es-CO"/>
+            <a:endParaRPr lang="es-CO" dirty="0"/>
           </a:p>
         </p:txBody>
       </p:sp>
@@ -693,7 +699,7 @@
           <a:bodyPr/>
           <a:lstStyle/>
           <a:p>
-            <a:endParaRPr lang="es-CO"/>
+            <a:endParaRPr lang="es-CO" dirty="0"/>
           </a:p>
         </p:txBody>
       </p:sp>
@@ -722,7 +728,7 @@
               <a:rPr lang="es-CO" smtClean="0"/>
               <a:t>‹Nº›</a:t>
             </a:fld>
-            <a:endParaRPr lang="es-CO"/>
+            <a:endParaRPr lang="es-CO" dirty="0"/>
           </a:p>
         </p:txBody>
       </p:sp>
@@ -868,7 +874,7 @@
               <a:rPr lang="es-CO" smtClean="0"/>
               <a:t>20/03/2023</a:t>
             </a:fld>
-            <a:endParaRPr lang="es-CO"/>
+            <a:endParaRPr lang="es-CO" dirty="0"/>
           </a:p>
         </p:txBody>
       </p:sp>
@@ -893,7 +899,7 @@
           <a:bodyPr/>
           <a:lstStyle/>
           <a:p>
-            <a:endParaRPr lang="es-CO"/>
+            <a:endParaRPr lang="es-CO" dirty="0"/>
           </a:p>
         </p:txBody>
       </p:sp>
@@ -922,7 +928,7 @@
               <a:rPr lang="es-CO" smtClean="0"/>
               <a:t>‹Nº›</a:t>
             </a:fld>
-            <a:endParaRPr lang="es-CO"/>
+            <a:endParaRPr lang="es-CO" dirty="0"/>
           </a:p>
         </p:txBody>
       </p:sp>
@@ -974,15 +980,15 @@
         </p:nvSpPr>
         <p:spPr>
           <a:xfrm>
-            <a:off x="831850" y="1709738"/>
-            <a:ext cx="10515600" cy="2852737"/>
+            <a:off x="623888" y="1709739"/>
+            <a:ext cx="7886700" cy="2852737"/>
           </a:xfrm>
         </p:spPr>
         <p:txBody>
           <a:bodyPr anchor="b"/>
           <a:lstStyle>
             <a:lvl1pPr>
-              <a:defRPr sz="6000"/>
+              <a:defRPr sz="4500"/>
             </a:lvl1pPr>
           </a:lstStyle>
           <a:p>
@@ -1012,8 +1018,8 @@
         </p:nvSpPr>
         <p:spPr>
           <a:xfrm>
-            <a:off x="831850" y="4589463"/>
-            <a:ext cx="10515600" cy="1500187"/>
+            <a:off x="623888" y="4589464"/>
+            <a:ext cx="7886700" cy="1500187"/>
           </a:xfrm>
         </p:spPr>
         <p:txBody>
@@ -1021,7 +1027,7 @@
           <a:lstStyle>
             <a:lvl1pPr marL="0" indent="0">
               <a:buNone/>
-              <a:defRPr sz="2400">
+              <a:defRPr sz="1800">
                 <a:solidFill>
                   <a:schemeClr val="tx1">
                     <a:tint val="75000"/>
@@ -1029,9 +1035,9 @@
                 </a:solidFill>
               </a:defRPr>
             </a:lvl1pPr>
-            <a:lvl2pPr marL="457200" indent="0">
-              <a:buNone/>
-              <a:defRPr sz="2000">
+            <a:lvl2pPr marL="342900" indent="0">
+              <a:buNone/>
+              <a:defRPr sz="1500">
                 <a:solidFill>
                   <a:schemeClr val="tx1">
                     <a:tint val="75000"/>
@@ -1039,9 +1045,9 @@
                 </a:solidFill>
               </a:defRPr>
             </a:lvl2pPr>
-            <a:lvl3pPr marL="914400" indent="0">
-              <a:buNone/>
-              <a:defRPr sz="1800">
+            <a:lvl3pPr marL="685800" indent="0">
+              <a:buNone/>
+              <a:defRPr sz="1350">
                 <a:solidFill>
                   <a:schemeClr val="tx1">
                     <a:tint val="75000"/>
@@ -1049,9 +1055,9 @@
                 </a:solidFill>
               </a:defRPr>
             </a:lvl3pPr>
-            <a:lvl4pPr marL="1371600" indent="0">
-              <a:buNone/>
-              <a:defRPr sz="1600">
+            <a:lvl4pPr marL="1028700" indent="0">
+              <a:buNone/>
+              <a:defRPr sz="1200">
                 <a:solidFill>
                   <a:schemeClr val="tx1">
                     <a:tint val="75000"/>
@@ -1059,9 +1065,9 @@
                 </a:solidFill>
               </a:defRPr>
             </a:lvl4pPr>
-            <a:lvl5pPr marL="1828800" indent="0">
-              <a:buNone/>
-              <a:defRPr sz="1600">
+            <a:lvl5pPr marL="1371600" indent="0">
+              <a:buNone/>
+              <a:defRPr sz="1200">
                 <a:solidFill>
                   <a:schemeClr val="tx1">
                     <a:tint val="75000"/>
@@ -1069,9 +1075,9 @@
                 </a:solidFill>
               </a:defRPr>
             </a:lvl5pPr>
-            <a:lvl6pPr marL="2286000" indent="0">
-              <a:buNone/>
-              <a:defRPr sz="1600">
+            <a:lvl6pPr marL="1714500" indent="0">
+              <a:buNone/>
+              <a:defRPr sz="1200">
                 <a:solidFill>
                   <a:schemeClr val="tx1">
                     <a:tint val="75000"/>
@@ -1079,9 +1085,9 @@
                 </a:solidFill>
               </a:defRPr>
             </a:lvl6pPr>
-            <a:lvl7pPr marL="2743200" indent="0">
-              <a:buNone/>
-              <a:defRPr sz="1600">
+            <a:lvl7pPr marL="2057400" indent="0">
+              <a:buNone/>
+              <a:defRPr sz="1200">
                 <a:solidFill>
                   <a:schemeClr val="tx1">
                     <a:tint val="75000"/>
@@ -1089,9 +1095,9 @@
                 </a:solidFill>
               </a:defRPr>
             </a:lvl7pPr>
-            <a:lvl8pPr marL="3200400" indent="0">
-              <a:buNone/>
-              <a:defRPr sz="1600">
+            <a:lvl8pPr marL="2400300" indent="0">
+              <a:buNone/>
+              <a:defRPr sz="1200">
                 <a:solidFill>
                   <a:schemeClr val="tx1">
                     <a:tint val="75000"/>
@@ -1099,9 +1105,9 @@
                 </a:solidFill>
               </a:defRPr>
             </a:lvl8pPr>
-            <a:lvl9pPr marL="3657600" indent="0">
-              <a:buNone/>
-              <a:defRPr sz="1600">
+            <a:lvl9pPr marL="2743200" indent="0">
+              <a:buNone/>
+              <a:defRPr sz="1200">
                 <a:solidFill>
                   <a:schemeClr val="tx1">
                     <a:tint val="75000"/>
@@ -1144,7 +1150,7 @@
               <a:rPr lang="es-CO" smtClean="0"/>
               <a:t>20/03/2023</a:t>
             </a:fld>
-            <a:endParaRPr lang="es-CO"/>
+            <a:endParaRPr lang="es-CO" dirty="0"/>
           </a:p>
         </p:txBody>
       </p:sp>
@@ -1169,7 +1175,7 @@
           <a:bodyPr/>
           <a:lstStyle/>
           <a:p>
-            <a:endParaRPr lang="es-CO"/>
+            <a:endParaRPr lang="es-CO" dirty="0"/>
           </a:p>
         </p:txBody>
       </p:sp>
@@ -1198,7 +1204,7 @@
               <a:rPr lang="es-CO" smtClean="0"/>
               <a:t>‹Nº›</a:t>
             </a:fld>
-            <a:endParaRPr lang="es-CO"/>
+            <a:endParaRPr lang="es-CO" dirty="0"/>
           </a:p>
         </p:txBody>
       </p:sp>
@@ -1279,8 +1285,8 @@
         </p:nvSpPr>
         <p:spPr>
           <a:xfrm>
-            <a:off x="838200" y="1825625"/>
-            <a:ext cx="5181600" cy="4351338"/>
+            <a:off x="628650" y="1825625"/>
+            <a:ext cx="3886200" cy="4351338"/>
           </a:xfrm>
         </p:spPr>
         <p:txBody>
@@ -1342,8 +1348,8 @@
         </p:nvSpPr>
         <p:spPr>
           <a:xfrm>
-            <a:off x="6172200" y="1825625"/>
-            <a:ext cx="5181600" cy="4351338"/>
+            <a:off x="4629150" y="1825625"/>
+            <a:ext cx="3886200" cy="4351338"/>
           </a:xfrm>
         </p:spPr>
         <p:txBody>
@@ -1412,7 +1418,7 @@
               <a:rPr lang="es-CO" smtClean="0"/>
               <a:t>20/03/2023</a:t>
             </a:fld>
-            <a:endParaRPr lang="es-CO"/>
+            <a:endParaRPr lang="es-CO" dirty="0"/>
           </a:p>
         </p:txBody>
       </p:sp>
@@ -1437,7 +1443,7 @@
           <a:bodyPr/>
           <a:lstStyle/>
           <a:p>
-            <a:endParaRPr lang="es-CO"/>
+            <a:endParaRPr lang="es-CO" dirty="0"/>
           </a:p>
         </p:txBody>
       </p:sp>
@@ -1466,7 +1472,7 @@
               <a:rPr lang="es-CO" smtClean="0"/>
               <a:t>‹Nº›</a:t>
             </a:fld>
-            <a:endParaRPr lang="es-CO"/>
+            <a:endParaRPr lang="es-CO" dirty="0"/>
           </a:p>
         </p:txBody>
       </p:sp>
@@ -1518,8 +1524,8 @@
         </p:nvSpPr>
         <p:spPr>
           <a:xfrm>
-            <a:off x="839788" y="365125"/>
-            <a:ext cx="10515600" cy="1325563"/>
+            <a:off x="629841" y="365126"/>
+            <a:ext cx="7886700" cy="1325563"/>
           </a:xfrm>
         </p:spPr>
         <p:txBody>
@@ -1552,8 +1558,8 @@
         </p:nvSpPr>
         <p:spPr>
           <a:xfrm>
-            <a:off x="839788" y="1681163"/>
-            <a:ext cx="5157787" cy="823912"/>
+            <a:off x="629842" y="1681163"/>
+            <a:ext cx="3868340" cy="823912"/>
           </a:xfrm>
         </p:spPr>
         <p:txBody>
@@ -1561,39 +1567,39 @@
           <a:lstStyle>
             <a:lvl1pPr marL="0" indent="0">
               <a:buNone/>
-              <a:defRPr sz="2400" b="1"/>
+              <a:defRPr sz="1800" b="1"/>
             </a:lvl1pPr>
-            <a:lvl2pPr marL="457200" indent="0">
-              <a:buNone/>
-              <a:defRPr sz="2000" b="1"/>
+            <a:lvl2pPr marL="342900" indent="0">
+              <a:buNone/>
+              <a:defRPr sz="1500" b="1"/>
             </a:lvl2pPr>
-            <a:lvl3pPr marL="914400" indent="0">
-              <a:buNone/>
-              <a:defRPr sz="1800" b="1"/>
+            <a:lvl3pPr marL="685800" indent="0">
+              <a:buNone/>
+              <a:defRPr sz="1350" b="1"/>
             </a:lvl3pPr>
-            <a:lvl4pPr marL="1371600" indent="0">
-              <a:buNone/>
-              <a:defRPr sz="1600" b="1"/>
+            <a:lvl4pPr marL="1028700" indent="0">
+              <a:buNone/>
+              <a:defRPr sz="1200" b="1"/>
             </a:lvl4pPr>
-            <a:lvl5pPr marL="1828800" indent="0">
-              <a:buNone/>
-              <a:defRPr sz="1600" b="1"/>
+            <a:lvl5pPr marL="1371600" indent="0">
+              <a:buNone/>
+              <a:defRPr sz="1200" b="1"/>
             </a:lvl5pPr>
-            <a:lvl6pPr marL="2286000" indent="0">
-              <a:buNone/>
-              <a:defRPr sz="1600" b="1"/>
+            <a:lvl6pPr marL="1714500" indent="0">
+              <a:buNone/>
+              <a:defRPr sz="1200" b="1"/>
             </a:lvl6pPr>
-            <a:lvl7pPr marL="2743200" indent="0">
-              <a:buNone/>
-              <a:defRPr sz="1600" b="1"/>
+            <a:lvl7pPr marL="2057400" indent="0">
+              <a:buNone/>
+              <a:defRPr sz="1200" b="1"/>
             </a:lvl7pPr>
-            <a:lvl8pPr marL="3200400" indent="0">
-              <a:buNone/>
-              <a:defRPr sz="1600" b="1"/>
+            <a:lvl8pPr marL="2400300" indent="0">
+              <a:buNone/>
+              <a:defRPr sz="1200" b="1"/>
             </a:lvl8pPr>
-            <a:lvl9pPr marL="3657600" indent="0">
-              <a:buNone/>
-              <a:defRPr sz="1600" b="1"/>
+            <a:lvl9pPr marL="2743200" indent="0">
+              <a:buNone/>
+              <a:defRPr sz="1200" b="1"/>
             </a:lvl9pPr>
           </a:lstStyle>
           <a:p>
@@ -1623,8 +1629,8 @@
         </p:nvSpPr>
         <p:spPr>
           <a:xfrm>
-            <a:off x="839788" y="2505075"/>
-            <a:ext cx="5157787" cy="3684588"/>
+            <a:off x="629842" y="2505075"/>
+            <a:ext cx="3868340" cy="3684588"/>
           </a:xfrm>
         </p:spPr>
         <p:txBody>
@@ -1686,8 +1692,8 @@
         </p:nvSpPr>
         <p:spPr>
           <a:xfrm>
-            <a:off x="6172200" y="1681163"/>
-            <a:ext cx="5183188" cy="823912"/>
+            <a:off x="4629150" y="1681163"/>
+            <a:ext cx="3887391" cy="823912"/>
           </a:xfrm>
         </p:spPr>
         <p:txBody>
@@ -1695,39 +1701,39 @@
           <a:lstStyle>
             <a:lvl1pPr marL="0" indent="0">
               <a:buNone/>
-              <a:defRPr sz="2400" b="1"/>
+              <a:defRPr sz="1800" b="1"/>
             </a:lvl1pPr>
-            <a:lvl2pPr marL="457200" indent="0">
-              <a:buNone/>
-              <a:defRPr sz="2000" b="1"/>
+            <a:lvl2pPr marL="342900" indent="0">
+              <a:buNone/>
+              <a:defRPr sz="1500" b="1"/>
             </a:lvl2pPr>
-            <a:lvl3pPr marL="914400" indent="0">
-              <a:buNone/>
-              <a:defRPr sz="1800" b="1"/>
+            <a:lvl3pPr marL="685800" indent="0">
+              <a:buNone/>
+              <a:defRPr sz="1350" b="1"/>
             </a:lvl3pPr>
-            <a:lvl4pPr marL="1371600" indent="0">
-              <a:buNone/>
-              <a:defRPr sz="1600" b="1"/>
+            <a:lvl4pPr marL="1028700" indent="0">
+              <a:buNone/>
+              <a:defRPr sz="1200" b="1"/>
             </a:lvl4pPr>
-            <a:lvl5pPr marL="1828800" indent="0">
-              <a:buNone/>
-              <a:defRPr sz="1600" b="1"/>
+            <a:lvl5pPr marL="1371600" indent="0">
+              <a:buNone/>
+              <a:defRPr sz="1200" b="1"/>
             </a:lvl5pPr>
-            <a:lvl6pPr marL="2286000" indent="0">
-              <a:buNone/>
-              <a:defRPr sz="1600" b="1"/>
+            <a:lvl6pPr marL="1714500" indent="0">
+              <a:buNone/>
+              <a:defRPr sz="1200" b="1"/>
             </a:lvl6pPr>
-            <a:lvl7pPr marL="2743200" indent="0">
-              <a:buNone/>
-              <a:defRPr sz="1600" b="1"/>
+            <a:lvl7pPr marL="2057400" indent="0">
+              <a:buNone/>
+              <a:defRPr sz="1200" b="1"/>
             </a:lvl7pPr>
-            <a:lvl8pPr marL="3200400" indent="0">
-              <a:buNone/>
-              <a:defRPr sz="1600" b="1"/>
+            <a:lvl8pPr marL="2400300" indent="0">
+              <a:buNone/>
+              <a:defRPr sz="1200" b="1"/>
             </a:lvl8pPr>
-            <a:lvl9pPr marL="3657600" indent="0">
-              <a:buNone/>
-              <a:defRPr sz="1600" b="1"/>
+            <a:lvl9pPr marL="2743200" indent="0">
+              <a:buNone/>
+              <a:defRPr sz="1200" b="1"/>
             </a:lvl9pPr>
           </a:lstStyle>
           <a:p>
@@ -1757,8 +1763,8 @@
         </p:nvSpPr>
         <p:spPr>
           <a:xfrm>
-            <a:off x="6172200" y="2505075"/>
-            <a:ext cx="5183188" cy="3684588"/>
+            <a:off x="4629150" y="2505075"/>
+            <a:ext cx="3887391" cy="3684588"/>
           </a:xfrm>
         </p:spPr>
         <p:txBody>
@@ -1827,7 +1833,7 @@
               <a:rPr lang="es-CO" smtClean="0"/>
               <a:t>20/03/2023</a:t>
             </a:fld>
-            <a:endParaRPr lang="es-CO"/>
+            <a:endParaRPr lang="es-CO" dirty="0"/>
           </a:p>
         </p:txBody>
       </p:sp>
@@ -1852,7 +1858,7 @@
           <a:bodyPr/>
           <a:lstStyle/>
           <a:p>
-            <a:endParaRPr lang="es-CO"/>
+            <a:endParaRPr lang="es-CO" dirty="0"/>
           </a:p>
         </p:txBody>
       </p:sp>
@@ -1881,7 +1887,7 @@
               <a:rPr lang="es-CO" smtClean="0"/>
               <a:t>‹Nº›</a:t>
             </a:fld>
-            <a:endParaRPr lang="es-CO"/>
+            <a:endParaRPr lang="es-CO" dirty="0"/>
           </a:p>
         </p:txBody>
       </p:sp>
@@ -1969,7 +1975,7 @@
               <a:rPr lang="es-CO" smtClean="0"/>
               <a:t>20/03/2023</a:t>
             </a:fld>
-            <a:endParaRPr lang="es-CO"/>
+            <a:endParaRPr lang="es-CO" dirty="0"/>
           </a:p>
         </p:txBody>
       </p:sp>
@@ -1994,7 +2000,7 @@
           <a:bodyPr/>
           <a:lstStyle/>
           <a:p>
-            <a:endParaRPr lang="es-CO"/>
+            <a:endParaRPr lang="es-CO" dirty="0"/>
           </a:p>
         </p:txBody>
       </p:sp>
@@ -2023,7 +2029,7 @@
               <a:rPr lang="es-CO" smtClean="0"/>
               <a:t>‹Nº›</a:t>
             </a:fld>
-            <a:endParaRPr lang="es-CO"/>
+            <a:endParaRPr lang="es-CO" dirty="0"/>
           </a:p>
         </p:txBody>
       </p:sp>
@@ -2082,7 +2088,7 @@
               <a:rPr lang="es-CO" smtClean="0"/>
               <a:t>20/03/2023</a:t>
             </a:fld>
-            <a:endParaRPr lang="es-CO"/>
+            <a:endParaRPr lang="es-CO" dirty="0"/>
           </a:p>
         </p:txBody>
       </p:sp>
@@ -2107,7 +2113,7 @@
           <a:bodyPr/>
           <a:lstStyle/>
           <a:p>
-            <a:endParaRPr lang="es-CO"/>
+            <a:endParaRPr lang="es-CO" dirty="0"/>
           </a:p>
         </p:txBody>
       </p:sp>
@@ -2136,7 +2142,7 @@
               <a:rPr lang="es-CO" smtClean="0"/>
               <a:t>‹Nº›</a:t>
             </a:fld>
-            <a:endParaRPr lang="es-CO"/>
+            <a:endParaRPr lang="es-CO" dirty="0"/>
           </a:p>
         </p:txBody>
       </p:sp>
@@ -2188,15 +2194,15 @@
         </p:nvSpPr>
         <p:spPr>
           <a:xfrm>
-            <a:off x="839788" y="457200"/>
-            <a:ext cx="3932237" cy="1600200"/>
+            <a:off x="629841" y="457200"/>
+            <a:ext cx="2949178" cy="1600200"/>
           </a:xfrm>
         </p:spPr>
         <p:txBody>
           <a:bodyPr anchor="b"/>
           <a:lstStyle>
             <a:lvl1pPr>
-              <a:defRPr sz="3200"/>
+              <a:defRPr sz="2400"/>
             </a:lvl1pPr>
           </a:lstStyle>
           <a:p>
@@ -2226,39 +2232,39 @@
         </p:nvSpPr>
         <p:spPr>
           <a:xfrm>
-            <a:off x="5183188" y="987425"/>
-            <a:ext cx="6172200" cy="4873625"/>
+            <a:off x="3887391" y="987426"/>
+            <a:ext cx="4629150" cy="4873625"/>
           </a:xfrm>
         </p:spPr>
         <p:txBody>
           <a:bodyPr/>
           <a:lstStyle>
             <a:lvl1pPr>
-              <a:defRPr sz="3200"/>
+              <a:defRPr sz="2400"/>
             </a:lvl1pPr>
             <a:lvl2pPr>
-              <a:defRPr sz="2800"/>
+              <a:defRPr sz="2100"/>
             </a:lvl2pPr>
             <a:lvl3pPr>
-              <a:defRPr sz="2400"/>
+              <a:defRPr sz="1800"/>
             </a:lvl3pPr>
             <a:lvl4pPr>
-              <a:defRPr sz="2000"/>
+              <a:defRPr sz="1500"/>
             </a:lvl4pPr>
             <a:lvl5pPr>
-              <a:defRPr sz="2000"/>
+              <a:defRPr sz="1500"/>
             </a:lvl5pPr>
             <a:lvl6pPr>
-              <a:defRPr sz="2000"/>
+              <a:defRPr sz="1500"/>
             </a:lvl6pPr>
             <a:lvl7pPr>
-              <a:defRPr sz="2000"/>
+              <a:defRPr sz="1500"/>
             </a:lvl7pPr>
             <a:lvl8pPr>
-              <a:defRPr sz="2000"/>
+              <a:defRPr sz="1500"/>
             </a:lvl8pPr>
             <a:lvl9pPr>
-              <a:defRPr sz="2000"/>
+              <a:defRPr sz="1500"/>
             </a:lvl9pPr>
           </a:lstStyle>
           <a:p>
@@ -2317,8 +2323,8 @@
         </p:nvSpPr>
         <p:spPr>
           <a:xfrm>
-            <a:off x="839788" y="2057400"/>
-            <a:ext cx="3932237" cy="3811588"/>
+            <a:off x="629841" y="2057400"/>
+            <a:ext cx="2949178" cy="3811588"/>
           </a:xfrm>
         </p:spPr>
         <p:txBody>
@@ -2326,39 +2332,39 @@
           <a:lstStyle>
             <a:lvl1pPr marL="0" indent="0">
               <a:buNone/>
-              <a:defRPr sz="1600"/>
+              <a:defRPr sz="1200"/>
             </a:lvl1pPr>
-            <a:lvl2pPr marL="457200" indent="0">
-              <a:buNone/>
-              <a:defRPr sz="1400"/>
+            <a:lvl2pPr marL="342900" indent="0">
+              <a:buNone/>
+              <a:defRPr sz="1050"/>
             </a:lvl2pPr>
-            <a:lvl3pPr marL="914400" indent="0">
-              <a:buNone/>
-              <a:defRPr sz="1200"/>
+            <a:lvl3pPr marL="685800" indent="0">
+              <a:buNone/>
+              <a:defRPr sz="900"/>
             </a:lvl3pPr>
-            <a:lvl4pPr marL="1371600" indent="0">
-              <a:buNone/>
-              <a:defRPr sz="1000"/>
+            <a:lvl4pPr marL="1028700" indent="0">
+              <a:buNone/>
+              <a:defRPr sz="750"/>
             </a:lvl4pPr>
-            <a:lvl5pPr marL="1828800" indent="0">
-              <a:buNone/>
-              <a:defRPr sz="1000"/>
+            <a:lvl5pPr marL="1371600" indent="0">
+              <a:buNone/>
+              <a:defRPr sz="750"/>
             </a:lvl5pPr>
-            <a:lvl6pPr marL="2286000" indent="0">
-              <a:buNone/>
-              <a:defRPr sz="1000"/>
+            <a:lvl6pPr marL="1714500" indent="0">
+              <a:buNone/>
+              <a:defRPr sz="750"/>
             </a:lvl6pPr>
-            <a:lvl7pPr marL="2743200" indent="0">
-              <a:buNone/>
-              <a:defRPr sz="1000"/>
+            <a:lvl7pPr marL="2057400" indent="0">
+              <a:buNone/>
+              <a:defRPr sz="750"/>
             </a:lvl7pPr>
-            <a:lvl8pPr marL="3200400" indent="0">
-              <a:buNone/>
-              <a:defRPr sz="1000"/>
+            <a:lvl8pPr marL="2400300" indent="0">
+              <a:buNone/>
+              <a:defRPr sz="750"/>
             </a:lvl8pPr>
-            <a:lvl9pPr marL="3657600" indent="0">
-              <a:buNone/>
-              <a:defRPr sz="1000"/>
+            <a:lvl9pPr marL="2743200" indent="0">
+              <a:buNone/>
+              <a:defRPr sz="750"/>
             </a:lvl9pPr>
           </a:lstStyle>
           <a:p>
@@ -2395,7 +2401,7 @@
               <a:rPr lang="es-CO" smtClean="0"/>
               <a:t>20/03/2023</a:t>
             </a:fld>
-            <a:endParaRPr lang="es-CO"/>
+            <a:endParaRPr lang="es-CO" dirty="0"/>
           </a:p>
         </p:txBody>
       </p:sp>
@@ -2420,7 +2426,7 @@
           <a:bodyPr/>
           <a:lstStyle/>
           <a:p>
-            <a:endParaRPr lang="es-CO"/>
+            <a:endParaRPr lang="es-CO" dirty="0"/>
           </a:p>
         </p:txBody>
       </p:sp>
@@ -2449,7 +2455,7 @@
               <a:rPr lang="es-CO" smtClean="0"/>
               <a:t>‹Nº›</a:t>
             </a:fld>
-            <a:endParaRPr lang="es-CO"/>
+            <a:endParaRPr lang="es-CO" dirty="0"/>
           </a:p>
         </p:txBody>
       </p:sp>
@@ -2501,15 +2507,15 @@
         </p:nvSpPr>
         <p:spPr>
           <a:xfrm>
-            <a:off x="839788" y="457200"/>
-            <a:ext cx="3932237" cy="1600200"/>
+            <a:off x="629841" y="457200"/>
+            <a:ext cx="2949178" cy="1600200"/>
           </a:xfrm>
         </p:spPr>
         <p:txBody>
           <a:bodyPr anchor="b"/>
           <a:lstStyle>
             <a:lvl1pPr>
-              <a:defRPr sz="3200"/>
+              <a:defRPr sz="2400"/>
             </a:lvl1pPr>
           </a:lstStyle>
           <a:p>
@@ -2539,8 +2545,8 @@
         </p:nvSpPr>
         <p:spPr>
           <a:xfrm>
-            <a:off x="5183188" y="987425"/>
-            <a:ext cx="6172200" cy="4873625"/>
+            <a:off x="3887391" y="987426"/>
+            <a:ext cx="4629150" cy="4873625"/>
           </a:xfrm>
         </p:spPr>
         <p:txBody>
@@ -2548,43 +2554,43 @@
           <a:lstStyle>
             <a:lvl1pPr marL="0" indent="0">
               <a:buNone/>
-              <a:defRPr sz="3200"/>
+              <a:defRPr sz="2400"/>
             </a:lvl1pPr>
-            <a:lvl2pPr marL="457200" indent="0">
-              <a:buNone/>
-              <a:defRPr sz="2800"/>
+            <a:lvl2pPr marL="342900" indent="0">
+              <a:buNone/>
+              <a:defRPr sz="2100"/>
             </a:lvl2pPr>
-            <a:lvl3pPr marL="914400" indent="0">
-              <a:buNone/>
-              <a:defRPr sz="2400"/>
+            <a:lvl3pPr marL="685800" indent="0">
+              <a:buNone/>
+              <a:defRPr sz="1800"/>
             </a:lvl3pPr>
-            <a:lvl4pPr marL="1371600" indent="0">
-              <a:buNone/>
-              <a:defRPr sz="2000"/>
+            <a:lvl4pPr marL="1028700" indent="0">
+              <a:buNone/>
+              <a:defRPr sz="1500"/>
             </a:lvl4pPr>
-            <a:lvl5pPr marL="1828800" indent="0">
-              <a:buNone/>
-              <a:defRPr sz="2000"/>
+            <a:lvl5pPr marL="1371600" indent="0">
+              <a:buNone/>
+              <a:defRPr sz="1500"/>
             </a:lvl5pPr>
-            <a:lvl6pPr marL="2286000" indent="0">
-              <a:buNone/>
-              <a:defRPr sz="2000"/>
+            <a:lvl6pPr marL="1714500" indent="0">
+              <a:buNone/>
+              <a:defRPr sz="1500"/>
             </a:lvl6pPr>
-            <a:lvl7pPr marL="2743200" indent="0">
-              <a:buNone/>
-              <a:defRPr sz="2000"/>
+            <a:lvl7pPr marL="2057400" indent="0">
+              <a:buNone/>
+              <a:defRPr sz="1500"/>
             </a:lvl7pPr>
-            <a:lvl8pPr marL="3200400" indent="0">
-              <a:buNone/>
-              <a:defRPr sz="2000"/>
+            <a:lvl8pPr marL="2400300" indent="0">
+              <a:buNone/>
+              <a:defRPr sz="1500"/>
             </a:lvl8pPr>
-            <a:lvl9pPr marL="3657600" indent="0">
-              <a:buNone/>
-              <a:defRPr sz="2000"/>
+            <a:lvl9pPr marL="2743200" indent="0">
+              <a:buNone/>
+              <a:defRPr sz="1500"/>
             </a:lvl9pPr>
           </a:lstStyle>
           <a:p>
-            <a:endParaRPr lang="es-CO"/>
+            <a:endParaRPr lang="es-CO" dirty="0"/>
           </a:p>
         </p:txBody>
       </p:sp>
@@ -2606,8 +2612,8 @@
         </p:nvSpPr>
         <p:spPr>
           <a:xfrm>
-            <a:off x="839788" y="2057400"/>
-            <a:ext cx="3932237" cy="3811588"/>
+            <a:off x="629841" y="2057400"/>
+            <a:ext cx="2949178" cy="3811588"/>
           </a:xfrm>
         </p:spPr>
         <p:txBody>
@@ -2615,39 +2621,39 @@
           <a:lstStyle>
             <a:lvl1pPr marL="0" indent="0">
               <a:buNone/>
-              <a:defRPr sz="1600"/>
+              <a:defRPr sz="1200"/>
             </a:lvl1pPr>
-            <a:lvl2pPr marL="457200" indent="0">
-              <a:buNone/>
-              <a:defRPr sz="1400"/>
+            <a:lvl2pPr marL="342900" indent="0">
+              <a:buNone/>
+              <a:defRPr sz="1050"/>
             </a:lvl2pPr>
-            <a:lvl3pPr marL="914400" indent="0">
-              <a:buNone/>
-              <a:defRPr sz="1200"/>
+            <a:lvl3pPr marL="685800" indent="0">
+              <a:buNone/>
+              <a:defRPr sz="900"/>
             </a:lvl3pPr>
-            <a:lvl4pPr marL="1371600" indent="0">
-              <a:buNone/>
-              <a:defRPr sz="1000"/>
+            <a:lvl4pPr marL="1028700" indent="0">
+              <a:buNone/>
+              <a:defRPr sz="750"/>
             </a:lvl4pPr>
-            <a:lvl5pPr marL="1828800" indent="0">
-              <a:buNone/>
-              <a:defRPr sz="1000"/>
+            <a:lvl5pPr marL="1371600" indent="0">
+              <a:buNone/>
+              <a:defRPr sz="750"/>
             </a:lvl5pPr>
-            <a:lvl6pPr marL="2286000" indent="0">
-              <a:buNone/>
-              <a:defRPr sz="1000"/>
+            <a:lvl6pPr marL="1714500" indent="0">
+              <a:buNone/>
+              <a:defRPr sz="750"/>
             </a:lvl6pPr>
-            <a:lvl7pPr marL="2743200" indent="0">
-              <a:buNone/>
-              <a:defRPr sz="1000"/>
+            <a:lvl7pPr marL="2057400" indent="0">
+              <a:buNone/>
+              <a:defRPr sz="750"/>
             </a:lvl7pPr>
-            <a:lvl8pPr marL="3200400" indent="0">
-              <a:buNone/>
-              <a:defRPr sz="1000"/>
+            <a:lvl8pPr marL="2400300" indent="0">
+              <a:buNone/>
+              <a:defRPr sz="750"/>
             </a:lvl8pPr>
-            <a:lvl9pPr marL="3657600" indent="0">
-              <a:buNone/>
-              <a:defRPr sz="1000"/>
+            <a:lvl9pPr marL="2743200" indent="0">
+              <a:buNone/>
+              <a:defRPr sz="750"/>
             </a:lvl9pPr>
           </a:lstStyle>
           <a:p>
@@ -2684,7 +2690,7 @@
               <a:rPr lang="es-CO" smtClean="0"/>
               <a:t>20/03/2023</a:t>
             </a:fld>
-            <a:endParaRPr lang="es-CO"/>
+            <a:endParaRPr lang="es-CO" dirty="0"/>
           </a:p>
         </p:txBody>
       </p:sp>
@@ -2709,7 +2715,7 @@
           <a:bodyPr/>
           <a:lstStyle/>
           <a:p>
-            <a:endParaRPr lang="es-CO"/>
+            <a:endParaRPr lang="es-CO" dirty="0"/>
           </a:p>
         </p:txBody>
       </p:sp>
@@ -2738,7 +2744,7 @@
               <a:rPr lang="es-CO" smtClean="0"/>
               <a:t>‹Nº›</a:t>
             </a:fld>
-            <a:endParaRPr lang="es-CO"/>
+            <a:endParaRPr lang="es-CO" dirty="0"/>
           </a:p>
         </p:txBody>
       </p:sp>
@@ -2825,8 +2831,8 @@
         </p:nvSpPr>
         <p:spPr>
           <a:xfrm>
-            <a:off x="838200" y="365125"/>
-            <a:ext cx="10515600" cy="1325563"/>
+            <a:off x="628650" y="365126"/>
+            <a:ext cx="7886700" cy="1325563"/>
           </a:xfrm>
           <a:prstGeom prst="rect">
             <a:avLst/>
@@ -2864,8 +2870,8 @@
         </p:nvSpPr>
         <p:spPr>
           <a:xfrm>
-            <a:off x="838200" y="1825625"/>
-            <a:ext cx="10515600" cy="4351338"/>
+            <a:off x="628650" y="1825625"/>
+            <a:ext cx="7886700" cy="4351338"/>
           </a:xfrm>
           <a:prstGeom prst="rect">
             <a:avLst/>
@@ -2932,8 +2938,8 @@
         </p:nvSpPr>
         <p:spPr>
           <a:xfrm>
-            <a:off x="838200" y="6356350"/>
-            <a:ext cx="2743200" cy="365125"/>
+            <a:off x="628650" y="6356351"/>
+            <a:ext cx="2057400" cy="365125"/>
           </a:xfrm>
           <a:prstGeom prst="rect">
             <a:avLst/>
@@ -2943,7 +2949,7 @@
           <a:bodyPr vert="horz" lIns="91440" tIns="45720" rIns="91440" bIns="45720" rtlCol="0" anchor="ctr"/>
           <a:lstStyle>
             <a:lvl1pPr algn="l">
-              <a:defRPr sz="1200">
+              <a:defRPr sz="900">
                 <a:solidFill>
                   <a:schemeClr val="tx1">
                     <a:tint val="75000"/>
@@ -2957,7 +2963,7 @@
               <a:rPr lang="es-CO" smtClean="0"/>
               <a:t>20/03/2023</a:t>
             </a:fld>
-            <a:endParaRPr lang="es-CO"/>
+            <a:endParaRPr lang="es-CO" dirty="0"/>
           </a:p>
         </p:txBody>
       </p:sp>
@@ -2979,8 +2985,8 @@
         </p:nvSpPr>
         <p:spPr>
           <a:xfrm>
-            <a:off x="4038600" y="6356350"/>
-            <a:ext cx="4114800" cy="365125"/>
+            <a:off x="3028950" y="6356351"/>
+            <a:ext cx="3086100" cy="365125"/>
           </a:xfrm>
           <a:prstGeom prst="rect">
             <a:avLst/>
@@ -2990,7 +2996,7 @@
           <a:bodyPr vert="horz" lIns="91440" tIns="45720" rIns="91440" bIns="45720" rtlCol="0" anchor="ctr"/>
           <a:lstStyle>
             <a:lvl1pPr algn="ctr">
-              <a:defRPr sz="1200">
+              <a:defRPr sz="900">
                 <a:solidFill>
                   <a:schemeClr val="tx1">
                     <a:tint val="75000"/>
@@ -3000,7 +3006,7 @@
             </a:lvl1pPr>
           </a:lstStyle>
           <a:p>
-            <a:endParaRPr lang="es-CO"/>
+            <a:endParaRPr lang="es-CO" dirty="0"/>
           </a:p>
         </p:txBody>
       </p:sp>
@@ -3022,8 +3028,8 @@
         </p:nvSpPr>
         <p:spPr>
           <a:xfrm>
-            <a:off x="8610600" y="6356350"/>
-            <a:ext cx="2743200" cy="365125"/>
+            <a:off x="6457950" y="6356351"/>
+            <a:ext cx="2057400" cy="365125"/>
           </a:xfrm>
           <a:prstGeom prst="rect">
             <a:avLst/>
@@ -3033,7 +3039,7 @@
           <a:bodyPr vert="horz" lIns="91440" tIns="45720" rIns="91440" bIns="45720" rtlCol="0" anchor="ctr"/>
           <a:lstStyle>
             <a:lvl1pPr algn="r">
-              <a:defRPr sz="1200">
+              <a:defRPr sz="900">
                 <a:solidFill>
                   <a:schemeClr val="tx1">
                     <a:tint val="75000"/>
@@ -3047,7 +3053,7 @@
               <a:rPr lang="es-CO" smtClean="0"/>
               <a:t>‹Nº›</a:t>
             </a:fld>
-            <a:endParaRPr lang="es-CO"/>
+            <a:endParaRPr lang="es-CO" dirty="0"/>
           </a:p>
         </p:txBody>
       </p:sp>
@@ -3074,7 +3080,7 @@
   </p:sldLayoutIdLst>
   <p:txStyles>
     <p:titleStyle>
-      <a:lvl1pPr algn="l" defTabSz="914400" rtl="0" eaLnBrk="1" latinLnBrk="0" hangingPunct="1">
+      <a:lvl1pPr algn="l" defTabSz="685800" rtl="0" eaLnBrk="1" latinLnBrk="0" hangingPunct="1">
         <a:lnSpc>
           <a:spcPct val="90000"/>
         </a:lnSpc>
@@ -3082,7 +3088,7 @@
           <a:spcPct val="0"/>
         </a:spcBef>
         <a:buNone/>
-        <a:defRPr sz="4400" kern="1200">
+        <a:defRPr sz="3300" kern="1200">
           <a:solidFill>
             <a:schemeClr val="tx1"/>
           </a:solidFill>
@@ -3093,16 +3099,16 @@
       </a:lvl1pPr>
     </p:titleStyle>
     <p:bodyStyle>
-      <a:lvl1pPr marL="228600" indent="-228600" algn="l" defTabSz="914400" rtl="0" eaLnBrk="1" latinLnBrk="0" hangingPunct="1">
+      <a:lvl1pPr marL="171450" indent="-171450" algn="l" defTabSz="685800" rtl="0" eaLnBrk="1" latinLnBrk="0" hangingPunct="1">
         <a:lnSpc>
           <a:spcPct val="90000"/>
         </a:lnSpc>
         <a:spcBef>
-          <a:spcPts val="1000"/>
+          <a:spcPts val="750"/>
         </a:spcBef>
         <a:buFont typeface="Arial" panose="020B0604020202020204" pitchFamily="34" charset="0"/>
         <a:buChar char="•"/>
-        <a:defRPr sz="2800" kern="1200">
+        <a:defRPr sz="2100" kern="1200">
           <a:solidFill>
             <a:schemeClr val="tx1"/>
           </a:solidFill>
@@ -3111,48 +3117,12 @@
           <a:cs typeface="+mn-cs"/>
         </a:defRPr>
       </a:lvl1pPr>
-      <a:lvl2pPr marL="685800" indent="-228600" algn="l" defTabSz="914400" rtl="0" eaLnBrk="1" latinLnBrk="0" hangingPunct="1">
+      <a:lvl2pPr marL="514350" indent="-171450" algn="l" defTabSz="685800" rtl="0" eaLnBrk="1" latinLnBrk="0" hangingPunct="1">
         <a:lnSpc>
           <a:spcPct val="90000"/>
         </a:lnSpc>
         <a:spcBef>
-          <a:spcPts val="500"/>
-        </a:spcBef>
-        <a:buFont typeface="Arial" panose="020B0604020202020204" pitchFamily="34" charset="0"/>
-        <a:buChar char="•"/>
-        <a:defRPr sz="2400" kern="1200">
-          <a:solidFill>
-            <a:schemeClr val="tx1"/>
-          </a:solidFill>
-          <a:latin typeface="+mn-lt"/>
-          <a:ea typeface="+mn-ea"/>
-          <a:cs typeface="+mn-cs"/>
-        </a:defRPr>
-      </a:lvl2pPr>
-      <a:lvl3pPr marL="1143000" indent="-228600" algn="l" defTabSz="914400" rtl="0" eaLnBrk="1" latinLnBrk="0" hangingPunct="1">
-        <a:lnSpc>
-          <a:spcPct val="90000"/>
-        </a:lnSpc>
-        <a:spcBef>
-          <a:spcPts val="500"/>
-        </a:spcBef>
-        <a:buFont typeface="Arial" panose="020B0604020202020204" pitchFamily="34" charset="0"/>
-        <a:buChar char="•"/>
-        <a:defRPr sz="2000" kern="1200">
-          <a:solidFill>
-            <a:schemeClr val="tx1"/>
-          </a:solidFill>
-          <a:latin typeface="+mn-lt"/>
-          <a:ea typeface="+mn-ea"/>
-          <a:cs typeface="+mn-cs"/>
-        </a:defRPr>
-      </a:lvl3pPr>
-      <a:lvl4pPr marL="1600200" indent="-228600" algn="l" defTabSz="914400" rtl="0" eaLnBrk="1" latinLnBrk="0" hangingPunct="1">
-        <a:lnSpc>
-          <a:spcPct val="90000"/>
-        </a:lnSpc>
-        <a:spcBef>
-          <a:spcPts val="500"/>
+          <a:spcPts val="375"/>
         </a:spcBef>
         <a:buFont typeface="Arial" panose="020B0604020202020204" pitchFamily="34" charset="0"/>
         <a:buChar char="•"/>
@@ -3164,17 +3134,53 @@
           <a:ea typeface="+mn-ea"/>
           <a:cs typeface="+mn-cs"/>
         </a:defRPr>
-      </a:lvl4pPr>
-      <a:lvl5pPr marL="2057400" indent="-228600" algn="l" defTabSz="914400" rtl="0" eaLnBrk="1" latinLnBrk="0" hangingPunct="1">
+      </a:lvl2pPr>
+      <a:lvl3pPr marL="857250" indent="-171450" algn="l" defTabSz="685800" rtl="0" eaLnBrk="1" latinLnBrk="0" hangingPunct="1">
         <a:lnSpc>
           <a:spcPct val="90000"/>
         </a:lnSpc>
         <a:spcBef>
-          <a:spcPts val="500"/>
+          <a:spcPts val="375"/>
         </a:spcBef>
         <a:buFont typeface="Arial" panose="020B0604020202020204" pitchFamily="34" charset="0"/>
         <a:buChar char="•"/>
-        <a:defRPr sz="1800" kern="1200">
+        <a:defRPr sz="1500" kern="1200">
+          <a:solidFill>
+            <a:schemeClr val="tx1"/>
+          </a:solidFill>
+          <a:latin typeface="+mn-lt"/>
+          <a:ea typeface="+mn-ea"/>
+          <a:cs typeface="+mn-cs"/>
+        </a:defRPr>
+      </a:lvl3pPr>
+      <a:lvl4pPr marL="1200150" indent="-171450" algn="l" defTabSz="685800" rtl="0" eaLnBrk="1" latinLnBrk="0" hangingPunct="1">
+        <a:lnSpc>
+          <a:spcPct val="90000"/>
+        </a:lnSpc>
+        <a:spcBef>
+          <a:spcPts val="375"/>
+        </a:spcBef>
+        <a:buFont typeface="Arial" panose="020B0604020202020204" pitchFamily="34" charset="0"/>
+        <a:buChar char="•"/>
+        <a:defRPr sz="1350" kern="1200">
+          <a:solidFill>
+            <a:schemeClr val="tx1"/>
+          </a:solidFill>
+          <a:latin typeface="+mn-lt"/>
+          <a:ea typeface="+mn-ea"/>
+          <a:cs typeface="+mn-cs"/>
+        </a:defRPr>
+      </a:lvl4pPr>
+      <a:lvl5pPr marL="1543050" indent="-171450" algn="l" defTabSz="685800" rtl="0" eaLnBrk="1" latinLnBrk="0" hangingPunct="1">
+        <a:lnSpc>
+          <a:spcPct val="90000"/>
+        </a:lnSpc>
+        <a:spcBef>
+          <a:spcPts val="375"/>
+        </a:spcBef>
+        <a:buFont typeface="Arial" panose="020B0604020202020204" pitchFamily="34" charset="0"/>
+        <a:buChar char="•"/>
+        <a:defRPr sz="1350" kern="1200">
           <a:solidFill>
             <a:schemeClr val="tx1"/>
           </a:solidFill>
@@ -3183,16 +3189,16 @@
           <a:cs typeface="+mn-cs"/>
         </a:defRPr>
       </a:lvl5pPr>
-      <a:lvl6pPr marL="2514600" indent="-228600" algn="l" defTabSz="914400" rtl="0" eaLnBrk="1" latinLnBrk="0" hangingPunct="1">
+      <a:lvl6pPr marL="1885950" indent="-171450" algn="l" defTabSz="685800" rtl="0" eaLnBrk="1" latinLnBrk="0" hangingPunct="1">
         <a:lnSpc>
           <a:spcPct val="90000"/>
         </a:lnSpc>
         <a:spcBef>
-          <a:spcPts val="500"/>
+          <a:spcPts val="375"/>
         </a:spcBef>
         <a:buFont typeface="Arial" panose="020B0604020202020204" pitchFamily="34" charset="0"/>
         <a:buChar char="•"/>
-        <a:defRPr sz="1800" kern="1200">
+        <a:defRPr sz="1350" kern="1200">
           <a:solidFill>
             <a:schemeClr val="tx1"/>
           </a:solidFill>
@@ -3201,16 +3207,16 @@
           <a:cs typeface="+mn-cs"/>
         </a:defRPr>
       </a:lvl6pPr>
-      <a:lvl7pPr marL="2971800" indent="-228600" algn="l" defTabSz="914400" rtl="0" eaLnBrk="1" latinLnBrk="0" hangingPunct="1">
+      <a:lvl7pPr marL="2228850" indent="-171450" algn="l" defTabSz="685800" rtl="0" eaLnBrk="1" latinLnBrk="0" hangingPunct="1">
         <a:lnSpc>
           <a:spcPct val="90000"/>
         </a:lnSpc>
         <a:spcBef>
-          <a:spcPts val="500"/>
+          <a:spcPts val="375"/>
         </a:spcBef>
         <a:buFont typeface="Arial" panose="020B0604020202020204" pitchFamily="34" charset="0"/>
         <a:buChar char="•"/>
-        <a:defRPr sz="1800" kern="1200">
+        <a:defRPr sz="1350" kern="1200">
           <a:solidFill>
             <a:schemeClr val="tx1"/>
           </a:solidFill>
@@ -3219,16 +3225,16 @@
           <a:cs typeface="+mn-cs"/>
         </a:defRPr>
       </a:lvl7pPr>
-      <a:lvl8pPr marL="3429000" indent="-228600" algn="l" defTabSz="914400" rtl="0" eaLnBrk="1" latinLnBrk="0" hangingPunct="1">
+      <a:lvl8pPr marL="2571750" indent="-171450" algn="l" defTabSz="685800" rtl="0" eaLnBrk="1" latinLnBrk="0" hangingPunct="1">
         <a:lnSpc>
           <a:spcPct val="90000"/>
         </a:lnSpc>
         <a:spcBef>
-          <a:spcPts val="500"/>
+          <a:spcPts val="375"/>
         </a:spcBef>
         <a:buFont typeface="Arial" panose="020B0604020202020204" pitchFamily="34" charset="0"/>
         <a:buChar char="•"/>
-        <a:defRPr sz="1800" kern="1200">
+        <a:defRPr sz="1350" kern="1200">
           <a:solidFill>
             <a:schemeClr val="tx1"/>
           </a:solidFill>
@@ -3237,16 +3243,16 @@
           <a:cs typeface="+mn-cs"/>
         </a:defRPr>
       </a:lvl8pPr>
-      <a:lvl9pPr marL="3886200" indent="-228600" algn="l" defTabSz="914400" rtl="0" eaLnBrk="1" latinLnBrk="0" hangingPunct="1">
+      <a:lvl9pPr marL="2914650" indent="-171450" algn="l" defTabSz="685800" rtl="0" eaLnBrk="1" latinLnBrk="0" hangingPunct="1">
         <a:lnSpc>
           <a:spcPct val="90000"/>
         </a:lnSpc>
         <a:spcBef>
-          <a:spcPts val="500"/>
+          <a:spcPts val="375"/>
         </a:spcBef>
         <a:buFont typeface="Arial" panose="020B0604020202020204" pitchFamily="34" charset="0"/>
         <a:buChar char="•"/>
-        <a:defRPr sz="1800" kern="1200">
+        <a:defRPr sz="1350" kern="1200">
           <a:solidFill>
             <a:schemeClr val="tx1"/>
           </a:solidFill>
@@ -3260,8 +3266,8 @@
       <a:defPPr>
         <a:defRPr lang="es-CO"/>
       </a:defPPr>
-      <a:lvl1pPr marL="0" algn="l" defTabSz="914400" rtl="0" eaLnBrk="1" latinLnBrk="0" hangingPunct="1">
-        <a:defRPr sz="1800" kern="1200">
+      <a:lvl1pPr marL="0" algn="l" defTabSz="685800" rtl="0" eaLnBrk="1" latinLnBrk="0" hangingPunct="1">
+        <a:defRPr sz="1350" kern="1200">
           <a:solidFill>
             <a:schemeClr val="tx1"/>
           </a:solidFill>
@@ -3270,8 +3276,8 @@
           <a:cs typeface="+mn-cs"/>
         </a:defRPr>
       </a:lvl1pPr>
-      <a:lvl2pPr marL="457200" algn="l" defTabSz="914400" rtl="0" eaLnBrk="1" latinLnBrk="0" hangingPunct="1">
-        <a:defRPr sz="1800" kern="1200">
+      <a:lvl2pPr marL="342900" algn="l" defTabSz="685800" rtl="0" eaLnBrk="1" latinLnBrk="0" hangingPunct="1">
+        <a:defRPr sz="1350" kern="1200">
           <a:solidFill>
             <a:schemeClr val="tx1"/>
           </a:solidFill>
@@ -3280,8 +3286,8 @@
           <a:cs typeface="+mn-cs"/>
         </a:defRPr>
       </a:lvl2pPr>
-      <a:lvl3pPr marL="914400" algn="l" defTabSz="914400" rtl="0" eaLnBrk="1" latinLnBrk="0" hangingPunct="1">
-        <a:defRPr sz="1800" kern="1200">
+      <a:lvl3pPr marL="685800" algn="l" defTabSz="685800" rtl="0" eaLnBrk="1" latinLnBrk="0" hangingPunct="1">
+        <a:defRPr sz="1350" kern="1200">
           <a:solidFill>
             <a:schemeClr val="tx1"/>
           </a:solidFill>
@@ -3290,8 +3296,8 @@
           <a:cs typeface="+mn-cs"/>
         </a:defRPr>
       </a:lvl3pPr>
-      <a:lvl4pPr marL="1371600" algn="l" defTabSz="914400" rtl="0" eaLnBrk="1" latinLnBrk="0" hangingPunct="1">
-        <a:defRPr sz="1800" kern="1200">
+      <a:lvl4pPr marL="1028700" algn="l" defTabSz="685800" rtl="0" eaLnBrk="1" latinLnBrk="0" hangingPunct="1">
+        <a:defRPr sz="1350" kern="1200">
           <a:solidFill>
             <a:schemeClr val="tx1"/>
           </a:solidFill>
@@ -3300,8 +3306,8 @@
           <a:cs typeface="+mn-cs"/>
         </a:defRPr>
       </a:lvl4pPr>
-      <a:lvl5pPr marL="1828800" algn="l" defTabSz="914400" rtl="0" eaLnBrk="1" latinLnBrk="0" hangingPunct="1">
-        <a:defRPr sz="1800" kern="1200">
+      <a:lvl5pPr marL="1371600" algn="l" defTabSz="685800" rtl="0" eaLnBrk="1" latinLnBrk="0" hangingPunct="1">
+        <a:defRPr sz="1350" kern="1200">
           <a:solidFill>
             <a:schemeClr val="tx1"/>
           </a:solidFill>
@@ -3310,8 +3316,8 @@
           <a:cs typeface="+mn-cs"/>
         </a:defRPr>
       </a:lvl5pPr>
-      <a:lvl6pPr marL="2286000" algn="l" defTabSz="914400" rtl="0" eaLnBrk="1" latinLnBrk="0" hangingPunct="1">
-        <a:defRPr sz="1800" kern="1200">
+      <a:lvl6pPr marL="1714500" algn="l" defTabSz="685800" rtl="0" eaLnBrk="1" latinLnBrk="0" hangingPunct="1">
+        <a:defRPr sz="1350" kern="1200">
           <a:solidFill>
             <a:schemeClr val="tx1"/>
           </a:solidFill>
@@ -3320,8 +3326,8 @@
           <a:cs typeface="+mn-cs"/>
         </a:defRPr>
       </a:lvl6pPr>
-      <a:lvl7pPr marL="2743200" algn="l" defTabSz="914400" rtl="0" eaLnBrk="1" latinLnBrk="0" hangingPunct="1">
-        <a:defRPr sz="1800" kern="1200">
+      <a:lvl7pPr marL="2057400" algn="l" defTabSz="685800" rtl="0" eaLnBrk="1" latinLnBrk="0" hangingPunct="1">
+        <a:defRPr sz="1350" kern="1200">
           <a:solidFill>
             <a:schemeClr val="tx1"/>
           </a:solidFill>
@@ -3330,8 +3336,8 @@
           <a:cs typeface="+mn-cs"/>
         </a:defRPr>
       </a:lvl7pPr>
-      <a:lvl8pPr marL="3200400" algn="l" defTabSz="914400" rtl="0" eaLnBrk="1" latinLnBrk="0" hangingPunct="1">
-        <a:defRPr sz="1800" kern="1200">
+      <a:lvl8pPr marL="2400300" algn="l" defTabSz="685800" rtl="0" eaLnBrk="1" latinLnBrk="0" hangingPunct="1">
+        <a:defRPr sz="1350" kern="1200">
           <a:solidFill>
             <a:schemeClr val="tx1"/>
           </a:solidFill>
@@ -3340,8 +3346,8 @@
           <a:cs typeface="+mn-cs"/>
         </a:defRPr>
       </a:lvl8pPr>
-      <a:lvl9pPr marL="3657600" algn="l" defTabSz="914400" rtl="0" eaLnBrk="1" latinLnBrk="0" hangingPunct="1">
-        <a:defRPr sz="1800" kern="1200">
+      <a:lvl9pPr marL="2743200" algn="l" defTabSz="685800" rtl="0" eaLnBrk="1" latinLnBrk="0" hangingPunct="1">
+        <a:defRPr sz="1350" kern="1200">
           <a:solidFill>
             <a:schemeClr val="tx1"/>
           </a:solidFill>
@@ -3374,10 +3380,10 @@
       </p:grpSpPr>
       <p:sp>
         <p:nvSpPr>
-          <p:cNvPr id="4" name="Rectángulo 3">
-            <a:extLst>
-              <a:ext uri="{FF2B5EF4-FFF2-40B4-BE49-F238E27FC236}">
-                <a16:creationId xmlns:a16="http://schemas.microsoft.com/office/drawing/2014/main" id="{6732CAB5-3BDD-4DC6-8885-6BF51C97338E}"/>
+          <p:cNvPr id="5" name="Rectángulo 4">
+            <a:extLst>
+              <a:ext uri="{FF2B5EF4-FFF2-40B4-BE49-F238E27FC236}">
+                <a16:creationId xmlns:a16="http://schemas.microsoft.com/office/drawing/2014/main" id="{094A6736-35AD-441B-9AE8-0B811CA4A999}"/>
               </a:ext>
             </a:extLst>
           </p:cNvPr>
@@ -3386,12 +3392,21 @@
         </p:nvSpPr>
         <p:spPr>
           <a:xfrm>
-            <a:off x="6490952" y="862884"/>
-            <a:ext cx="4572000" cy="3747753"/>
+            <a:off x="-1" y="0"/>
+            <a:ext cx="9144001" cy="6858000"/>
           </a:xfrm>
           <a:prstGeom prst="rect">
             <a:avLst/>
           </a:prstGeom>
+          <a:blipFill>
+            <a:blip r:embed="rId2"/>
+            <a:stretch>
+              <a:fillRect b="-8452"/>
+            </a:stretch>
+          </a:blipFill>
+          <a:ln>
+            <a:noFill/>
+          </a:ln>
         </p:spPr>
         <p:style>
           <a:lnRef idx="2">
@@ -3413,21 +3428,1572 @@
           <a:bodyPr rtlCol="0" anchor="ctr"/>
           <a:lstStyle/>
           <a:p>
+            <a:br>
+              <a:rPr lang="es-ES" sz="1500" dirty="0">
+                <a:solidFill>
+                  <a:schemeClr val="tx1"/>
+                </a:solidFill>
+                <a:latin typeface="Times New Roman" panose="02020603050405020304" pitchFamily="18" charset="0"/>
+              </a:rPr>
+            </a:br>
+            <a:endParaRPr lang="es-CO" sz="1500" u="sng" dirty="0">
+              <a:solidFill>
+                <a:schemeClr val="tx1"/>
+              </a:solidFill>
+            </a:endParaRPr>
+          </a:p>
+        </p:txBody>
+      </p:sp>
+      <p:sp>
+        <p:nvSpPr>
+          <p:cNvPr id="6" name="Rectángulo 5">
+            <a:extLst>
+              <a:ext uri="{FF2B5EF4-FFF2-40B4-BE49-F238E27FC236}">
+                <a16:creationId xmlns:a16="http://schemas.microsoft.com/office/drawing/2014/main" id="{1D7BAA42-1A8A-43C8-B209-D1AFAA845598}"/>
+              </a:ext>
+            </a:extLst>
+          </p:cNvPr>
+          <p:cNvSpPr/>
+          <p:nvPr/>
+        </p:nvSpPr>
+        <p:spPr>
+          <a:xfrm>
+            <a:off x="0" y="0"/>
+            <a:ext cx="9144000" cy="6858000"/>
+          </a:xfrm>
+          <a:prstGeom prst="rect">
+            <a:avLst/>
+          </a:prstGeom>
+          <a:gradFill flip="none" rotWithShape="1">
+            <a:gsLst>
+              <a:gs pos="0">
+                <a:schemeClr val="accent1">
+                  <a:lumMod val="0"/>
+                  <a:lumOff val="100000"/>
+                  <a:alpha val="60000"/>
+                </a:schemeClr>
+              </a:gs>
+              <a:gs pos="35000">
+                <a:schemeClr val="accent1">
+                  <a:lumMod val="0"/>
+                  <a:lumOff val="100000"/>
+                  <a:alpha val="96000"/>
+                </a:schemeClr>
+              </a:gs>
+              <a:gs pos="100000">
+                <a:schemeClr val="accent1">
+                  <a:lumMod val="100000"/>
+                  <a:alpha val="80000"/>
+                </a:schemeClr>
+              </a:gs>
+            </a:gsLst>
+            <a:path path="circle">
+              <a:fillToRect l="50000" t="-80000" r="50000" b="180000"/>
+            </a:path>
+            <a:tileRect/>
+          </a:gradFill>
+          <a:ln>
+            <a:noFill/>
+          </a:ln>
+        </p:spPr>
+        <p:style>
+          <a:lnRef idx="2">
+            <a:schemeClr val="accent1">
+              <a:shade val="50000"/>
+            </a:schemeClr>
+          </a:lnRef>
+          <a:fillRef idx="1">
+            <a:schemeClr val="accent1"/>
+          </a:fillRef>
+          <a:effectRef idx="0">
+            <a:schemeClr val="accent1"/>
+          </a:effectRef>
+          <a:fontRef idx="minor">
+            <a:schemeClr val="lt1"/>
+          </a:fontRef>
+        </p:style>
+        <p:txBody>
+          <a:bodyPr rtlCol="0" anchor="ctr"/>
+          <a:lstStyle/>
+          <a:p>
+            <a:br>
+              <a:rPr lang="es-ES" sz="1500" u="sng" dirty="0">
+                <a:solidFill>
+                  <a:schemeClr val="tx1"/>
+                </a:solidFill>
+                <a:latin typeface="Times New Roman" panose="02020603050405020304" pitchFamily="18" charset="0"/>
+              </a:rPr>
+            </a:br>
+            <a:endParaRPr lang="es-CO" sz="1500" u="sng" dirty="0">
+              <a:solidFill>
+                <a:schemeClr val="tx1"/>
+              </a:solidFill>
+            </a:endParaRPr>
+          </a:p>
+        </p:txBody>
+      </p:sp>
+      <p:sp>
+        <p:nvSpPr>
+          <p:cNvPr id="7" name="Rectángulo 6">
+            <a:extLst>
+              <a:ext uri="{FF2B5EF4-FFF2-40B4-BE49-F238E27FC236}">
+                <a16:creationId xmlns:a16="http://schemas.microsoft.com/office/drawing/2014/main" id="{AC8F9F23-DF4C-486F-955B-46B8A656C220}"/>
+              </a:ext>
+            </a:extLst>
+          </p:cNvPr>
+          <p:cNvSpPr/>
+          <p:nvPr/>
+        </p:nvSpPr>
+        <p:spPr>
+          <a:xfrm>
+            <a:off x="5788858" y="3429000"/>
+            <a:ext cx="3355142" cy="862876"/>
+          </a:xfrm>
+          <a:prstGeom prst="rect">
+            <a:avLst/>
+          </a:prstGeom>
+          <a:noFill/>
+          <a:ln>
+            <a:noFill/>
+          </a:ln>
+        </p:spPr>
+        <p:style>
+          <a:lnRef idx="2">
+            <a:schemeClr val="accent1">
+              <a:shade val="50000"/>
+            </a:schemeClr>
+          </a:lnRef>
+          <a:fillRef idx="1">
+            <a:schemeClr val="accent1"/>
+          </a:fillRef>
+          <a:effectRef idx="0">
+            <a:schemeClr val="accent1"/>
+          </a:effectRef>
+          <a:fontRef idx="minor">
+            <a:schemeClr val="lt1"/>
+          </a:fontRef>
+        </p:style>
+        <p:txBody>
+          <a:bodyPr rtlCol="0" anchor="ctr"/>
+          <a:lstStyle/>
+          <a:p>
             <a:pPr algn="ctr"/>
-            <a:endParaRPr lang="es-CO" u="sng" dirty="0"/>
+            <a:r>
+              <a:rPr lang="es-ES" dirty="0">
+                <a:solidFill>
+                  <a:schemeClr val="tx1"/>
+                </a:solidFill>
+                <a:latin typeface="Times New Roman" panose="02020603050405020304" pitchFamily="18" charset="0"/>
+              </a:rPr>
+              <a:t>Ilustración en blanco y negro de </a:t>
+            </a:r>
+          </a:p>
+          <a:p>
+            <a:pPr algn="ctr"/>
+            <a:r>
+              <a:rPr lang="es-ES" dirty="0" err="1">
+                <a:solidFill>
+                  <a:schemeClr val="tx1"/>
+                </a:solidFill>
+                <a:latin typeface="Times New Roman" panose="02020603050405020304" pitchFamily="18" charset="0"/>
+              </a:rPr>
+              <a:t>Gustave</a:t>
+            </a:r>
+            <a:r>
+              <a:rPr lang="es-ES" dirty="0">
+                <a:solidFill>
+                  <a:schemeClr val="tx1"/>
+                </a:solidFill>
+                <a:latin typeface="Times New Roman" panose="02020603050405020304" pitchFamily="18" charset="0"/>
+              </a:rPr>
+              <a:t> Doré, siglo XIX</a:t>
+            </a:r>
+          </a:p>
+        </p:txBody>
+      </p:sp>
+      <p:pic>
+        <p:nvPicPr>
+          <p:cNvPr id="9" name="Imagen 8">
+            <a:extLst>
+              <a:ext uri="{FF2B5EF4-FFF2-40B4-BE49-F238E27FC236}">
+                <a16:creationId xmlns:a16="http://schemas.microsoft.com/office/drawing/2014/main" id="{4A30BB67-229F-4A1D-B946-34EE2953B11C}"/>
+              </a:ext>
+            </a:extLst>
+          </p:cNvPr>
+          <p:cNvPicPr>
+            <a:picLocks noChangeAspect="1"/>
+          </p:cNvPicPr>
+          <p:nvPr/>
+        </p:nvPicPr>
+        <p:blipFill>
+          <a:blip r:embed="rId3">
+            <a:extLst>
+              <a:ext uri="{28A0092B-C50C-407E-A947-70E740481C1C}">
+                <a14:useLocalDpi xmlns:a14="http://schemas.microsoft.com/office/drawing/2010/main" val="0"/>
+              </a:ext>
+            </a:extLst>
+          </a:blip>
+          <a:stretch>
+            <a:fillRect/>
+          </a:stretch>
+        </p:blipFill>
+        <p:spPr>
+          <a:xfrm>
+            <a:off x="6170544" y="434648"/>
+            <a:ext cx="2408864" cy="2994352"/>
+          </a:xfrm>
+          <a:prstGeom prst="rect">
+            <a:avLst/>
+          </a:prstGeom>
+          <a:ln>
+            <a:noFill/>
+          </a:ln>
+          <a:effectLst>
+            <a:outerShdw blurRad="190500" algn="tl" rotWithShape="0">
+              <a:srgbClr val="000000">
+                <a:alpha val="70000"/>
+              </a:srgbClr>
+            </a:outerShdw>
+          </a:effectLst>
+        </p:spPr>
+      </p:pic>
+      <p:sp>
+        <p:nvSpPr>
+          <p:cNvPr id="10" name="Rectángulo: esquinas redondeadas 9">
+            <a:extLst>
+              <a:ext uri="{FF2B5EF4-FFF2-40B4-BE49-F238E27FC236}">
+                <a16:creationId xmlns:a16="http://schemas.microsoft.com/office/drawing/2014/main" id="{BF200F94-976F-4A3D-9909-1C09F12F09C1}"/>
+              </a:ext>
+            </a:extLst>
+          </p:cNvPr>
+          <p:cNvSpPr/>
+          <p:nvPr/>
+        </p:nvSpPr>
+        <p:spPr>
+          <a:xfrm>
+            <a:off x="206194" y="357623"/>
+            <a:ext cx="5582664" cy="1021556"/>
+          </a:xfrm>
+          <a:prstGeom prst="roundRect">
+            <a:avLst/>
+          </a:prstGeom>
+          <a:noFill/>
+          <a:ln w="9525" cap="flat" cmpd="sng" algn="ctr">
+            <a:solidFill>
+              <a:schemeClr val="dk1"/>
+            </a:solidFill>
+            <a:prstDash val="solid"/>
+            <a:round/>
+            <a:headEnd type="none" w="med" len="med"/>
+            <a:tailEnd type="none" w="med" len="med"/>
+          </a:ln>
+        </p:spPr>
+        <p:style>
+          <a:lnRef idx="0">
+            <a:scrgbClr r="0" g="0" b="0"/>
+          </a:lnRef>
+          <a:fillRef idx="0">
+            <a:scrgbClr r="0" g="0" b="0"/>
+          </a:fillRef>
+          <a:effectRef idx="0">
+            <a:scrgbClr r="0" g="0" b="0"/>
+          </a:effectRef>
+          <a:fontRef idx="minor">
+            <a:schemeClr val="dk1"/>
+          </a:fontRef>
+        </p:style>
+        <p:txBody>
+          <a:bodyPr wrap="square" lIns="91440" tIns="45720" rIns="91440" bIns="45720">
+            <a:spAutoFit/>
+          </a:bodyPr>
+          <a:lstStyle/>
+          <a:p>
+            <a:pPr algn="ctr"/>
+            <a:r>
+              <a:rPr lang="es-ES" sz="5400" b="1" dirty="0">
+                <a:ln w="13462">
+                  <a:solidFill>
+                    <a:schemeClr val="bg1"/>
+                  </a:solidFill>
+                  <a:prstDash val="solid"/>
+                </a:ln>
+                <a:solidFill>
+                  <a:schemeClr val="tx1">
+                    <a:lumMod val="85000"/>
+                    <a:lumOff val="15000"/>
+                  </a:schemeClr>
+                </a:solidFill>
+                <a:effectLst>
+                  <a:outerShdw dist="38100" dir="2700000" algn="bl" rotWithShape="0">
+                    <a:schemeClr val="accent5"/>
+                  </a:outerShdw>
+                </a:effectLst>
+              </a:rPr>
+              <a:t>EL Gato Con Botas</a:t>
+            </a:r>
+          </a:p>
+        </p:txBody>
+      </p:sp>
+      <p:sp>
+        <p:nvSpPr>
+          <p:cNvPr id="11" name="Rectángulo: esquinas redondeadas 10">
+            <a:extLst>
+              <a:ext uri="{FF2B5EF4-FFF2-40B4-BE49-F238E27FC236}">
+                <a16:creationId xmlns:a16="http://schemas.microsoft.com/office/drawing/2014/main" id="{DB6AC5B2-BDA8-4552-8C65-07C7FD9AC1BE}"/>
+              </a:ext>
+            </a:extLst>
+          </p:cNvPr>
+          <p:cNvSpPr/>
+          <p:nvPr/>
+        </p:nvSpPr>
+        <p:spPr>
+          <a:xfrm>
+            <a:off x="206193" y="1379179"/>
+            <a:ext cx="1574472" cy="510778"/>
+          </a:xfrm>
+          <a:prstGeom prst="roundRect">
+            <a:avLst/>
+          </a:prstGeom>
+          <a:noFill/>
+          <a:ln w="9525" cap="flat" cmpd="sng" algn="ctr">
+            <a:noFill/>
+            <a:prstDash val="solid"/>
+            <a:round/>
+            <a:headEnd type="none" w="med" len="med"/>
+            <a:tailEnd type="none" w="med" len="med"/>
+          </a:ln>
+        </p:spPr>
+        <p:style>
+          <a:lnRef idx="0">
+            <a:scrgbClr r="0" g="0" b="0"/>
+          </a:lnRef>
+          <a:fillRef idx="0">
+            <a:scrgbClr r="0" g="0" b="0"/>
+          </a:fillRef>
+          <a:effectRef idx="0">
+            <a:scrgbClr r="0" g="0" b="0"/>
+          </a:effectRef>
+          <a:fontRef idx="minor">
+            <a:schemeClr val="dk1"/>
+          </a:fontRef>
+        </p:style>
+        <p:txBody>
+          <a:bodyPr wrap="square" lIns="91440" tIns="45720" rIns="91440" bIns="45720">
+            <a:spAutoFit/>
+          </a:bodyPr>
+          <a:lstStyle/>
+          <a:p>
+            <a:pPr algn="ctr"/>
+            <a:r>
+              <a:rPr lang="es-ES" sz="2400" b="1" dirty="0">
+                <a:ln w="0"/>
+                <a:solidFill>
+                  <a:schemeClr val="tx2"/>
+                </a:solidFill>
+                <a:effectLst>
+                  <a:outerShdw blurRad="38100" dist="19050" dir="2700000" algn="tl" rotWithShape="0">
+                    <a:schemeClr val="dk1">
+                      <a:alpha val="40000"/>
+                    </a:schemeClr>
+                  </a:outerShdw>
+                </a:effectLst>
+              </a:rPr>
+              <a:t>El Cuento</a:t>
+            </a:r>
+          </a:p>
+        </p:txBody>
+      </p:sp>
+      <p:sp>
+        <p:nvSpPr>
+          <p:cNvPr id="12" name="CuadroTexto 11">
+            <a:extLst>
+              <a:ext uri="{FF2B5EF4-FFF2-40B4-BE49-F238E27FC236}">
+                <a16:creationId xmlns:a16="http://schemas.microsoft.com/office/drawing/2014/main" id="{FF116394-25ED-4A63-9B3C-EC63E164A1EF}"/>
+              </a:ext>
+            </a:extLst>
+          </p:cNvPr>
+          <p:cNvSpPr txBox="1"/>
+          <p:nvPr/>
+        </p:nvSpPr>
+        <p:spPr>
+          <a:xfrm>
+            <a:off x="206193" y="2026845"/>
+            <a:ext cx="5399759" cy="3162687"/>
+          </a:xfrm>
+          <a:prstGeom prst="roundRect">
+            <a:avLst>
+              <a:gd name="adj" fmla="val 24583"/>
+            </a:avLst>
+          </a:prstGeom>
+          <a:noFill/>
+          <a:ln>
+            <a:solidFill>
+              <a:srgbClr val="003399">
+                <a:alpha val="20000"/>
+              </a:srgbClr>
+            </a:solidFill>
+          </a:ln>
+        </p:spPr>
+        <p:txBody>
+          <a:bodyPr wrap="square" rtlCol="0">
+            <a:spAutoFit/>
+          </a:bodyPr>
+          <a:lstStyle/>
+          <a:p>
+            <a:r>
+              <a:rPr lang="es-CO" sz="2000" b="1" dirty="0">
+                <a:solidFill>
+                  <a:srgbClr val="002060"/>
+                </a:solidFill>
+                <a:effectLst>
+                  <a:outerShdw blurRad="38100" dist="38100" dir="2700000" algn="tl">
+                    <a:srgbClr val="000000">
+                      <a:alpha val="43137"/>
+                    </a:srgbClr>
+                  </a:outerShdw>
+                </a:effectLst>
+                <a:latin typeface="Arial" panose="020B0604020202020204" pitchFamily="34" charset="0"/>
+                <a:cs typeface="Arial" panose="020B0604020202020204" pitchFamily="34" charset="0"/>
+              </a:rPr>
+              <a:t>Rezumen </a:t>
+            </a:r>
+          </a:p>
+          <a:p>
+            <a:endParaRPr lang="es-CO" sz="1050" dirty="0">
+              <a:latin typeface="Arial" panose="020B0604020202020204" pitchFamily="34" charset="0"/>
+              <a:cs typeface="Arial" panose="020B0604020202020204" pitchFamily="34" charset="0"/>
+            </a:endParaRPr>
+          </a:p>
+          <a:p>
+            <a:r>
+              <a:rPr lang="es-ES" sz="2000" dirty="0">
+                <a:latin typeface="Arial" panose="020B0604020202020204" pitchFamily="34" charset="0"/>
+                <a:cs typeface="Arial" panose="020B0604020202020204" pitchFamily="34" charset="0"/>
+              </a:rPr>
+              <a:t>El protagonista es un gato que lleva botas</a:t>
+            </a:r>
+          </a:p>
+          <a:p>
+            <a:r>
+              <a:rPr lang="es-ES" sz="2000" dirty="0">
+                <a:latin typeface="Arial" panose="020B0604020202020204" pitchFamily="34" charset="0"/>
+                <a:cs typeface="Arial" panose="020B0604020202020204" pitchFamily="34" charset="0"/>
+              </a:rPr>
+              <a:t>y vestimenta. Es un personaje al servicio</a:t>
+            </a:r>
+          </a:p>
+          <a:p>
+            <a:r>
+              <a:rPr lang="es-ES" sz="2000" dirty="0">
+                <a:latin typeface="Arial" panose="020B0604020202020204" pitchFamily="34" charset="0"/>
+                <a:cs typeface="Arial" panose="020B0604020202020204" pitchFamily="34" charset="0"/>
+              </a:rPr>
+              <a:t>de un joven que vive con pocos recursos.</a:t>
+            </a:r>
+          </a:p>
+          <a:p>
+            <a:r>
+              <a:rPr lang="es-ES" sz="2000" dirty="0">
+                <a:latin typeface="Arial" panose="020B0604020202020204" pitchFamily="34" charset="0"/>
+                <a:cs typeface="Arial" panose="020B0604020202020204" pitchFamily="34" charset="0"/>
+              </a:rPr>
+              <a:t> </a:t>
+            </a:r>
+          </a:p>
+          <a:p>
+            <a:r>
+              <a:rPr lang="es-ES" sz="2000" dirty="0">
+                <a:latin typeface="Arial" panose="020B0604020202020204" pitchFamily="34" charset="0"/>
+                <a:cs typeface="Arial" panose="020B0604020202020204" pitchFamily="34" charset="0"/>
+              </a:rPr>
+              <a:t>Por medio de la astucia del gato consigue </a:t>
+            </a:r>
+          </a:p>
+          <a:p>
+            <a:r>
+              <a:rPr lang="es-ES" sz="2000" dirty="0">
+                <a:latin typeface="Arial" panose="020B0604020202020204" pitchFamily="34" charset="0"/>
+                <a:cs typeface="Arial" panose="020B0604020202020204" pitchFamily="34" charset="0"/>
+              </a:rPr>
+              <a:t>para su amo toda clase de dádivas, </a:t>
+            </a:r>
+          </a:p>
+          <a:p>
+            <a:r>
+              <a:rPr lang="es-ES" sz="2000" dirty="0">
+                <a:latin typeface="Arial" panose="020B0604020202020204" pitchFamily="34" charset="0"/>
+                <a:cs typeface="Arial" panose="020B0604020202020204" pitchFamily="34" charset="0"/>
+              </a:rPr>
+              <a:t>incluido el matrimonio con la hija del rey.</a:t>
+            </a:r>
+            <a:endParaRPr lang="es-CO" sz="2000" dirty="0">
+              <a:latin typeface="Arial" panose="020B0604020202020204" pitchFamily="34" charset="0"/>
+              <a:cs typeface="Arial" panose="020B0604020202020204" pitchFamily="34" charset="0"/>
+            </a:endParaRPr>
           </a:p>
         </p:txBody>
       </p:sp>
     </p:spTree>
     <p:extLst>
       <p:ext uri="{BB962C8B-B14F-4D97-AF65-F5344CB8AC3E}">
-        <p14:creationId xmlns:p14="http://schemas.microsoft.com/office/powerpoint/2010/main" val="1578119998"/>
+        <p14:creationId xmlns:p14="http://schemas.microsoft.com/office/powerpoint/2010/main" val="629751353"/>
       </p:ext>
     </p:extLst>
   </p:cSld>
   <p:clrMapOvr>
     <a:masterClrMapping/>
   </p:clrMapOvr>
+  <p:transition spd="slow">
+    <p:wipe dir="r"/>
+  </p:transition>
+  <p:timing>
+    <p:tnLst>
+      <p:par>
+        <p:cTn id="1" dur="indefinite" restart="never" nodeType="tmRoot">
+          <p:childTnLst>
+            <p:seq concurrent="1" nextAc="seek">
+              <p:cTn id="2" dur="indefinite" nodeType="mainSeq">
+                <p:childTnLst>
+                  <p:par>
+                    <p:cTn id="3" fill="hold">
+                      <p:stCondLst>
+                        <p:cond delay="indefinite"/>
+                      </p:stCondLst>
+                      <p:childTnLst>
+                        <p:par>
+                          <p:cTn id="4" fill="hold">
+                            <p:stCondLst>
+                              <p:cond delay="0"/>
+                            </p:stCondLst>
+                            <p:childTnLst>
+                              <p:par>
+                                <p:cTn id="5" presetID="22" presetClass="entr" presetSubtype="4" fill="hold" grpId="0" nodeType="clickEffect">
+                                  <p:stCondLst>
+                                    <p:cond delay="200"/>
+                                  </p:stCondLst>
+                                  <p:childTnLst>
+                                    <p:set>
+                                      <p:cBhvr>
+                                        <p:cTn id="6" dur="1" fill="hold">
+                                          <p:stCondLst>
+                                            <p:cond delay="0"/>
+                                          </p:stCondLst>
+                                        </p:cTn>
+                                        <p:tgtEl>
+                                          <p:spTgt spid="6"/>
+                                        </p:tgtEl>
+                                        <p:attrNameLst>
+                                          <p:attrName>style.visibility</p:attrName>
+                                        </p:attrNameLst>
+                                      </p:cBhvr>
+                                      <p:to>
+                                        <p:strVal val="visible"/>
+                                      </p:to>
+                                    </p:set>
+                                    <p:animEffect transition="in" filter="wipe(down)">
+                                      <p:cBhvr>
+                                        <p:cTn id="7" dur="1000"/>
+                                        <p:tgtEl>
+                                          <p:spTgt spid="6"/>
+                                        </p:tgtEl>
+                                      </p:cBhvr>
+                                    </p:animEffect>
+                                  </p:childTnLst>
+                                </p:cTn>
+                              </p:par>
+                            </p:childTnLst>
+                          </p:cTn>
+                        </p:par>
+                        <p:par>
+                          <p:cTn id="8" fill="hold">
+                            <p:stCondLst>
+                              <p:cond delay="1200"/>
+                            </p:stCondLst>
+                            <p:childTnLst>
+                              <p:par>
+                                <p:cTn id="9" presetID="21" presetClass="entr" presetSubtype="1" fill="hold" grpId="0" nodeType="afterEffect">
+                                  <p:stCondLst>
+                                    <p:cond delay="0"/>
+                                  </p:stCondLst>
+                                  <p:childTnLst>
+                                    <p:set>
+                                      <p:cBhvr>
+                                        <p:cTn id="10" dur="1" fill="hold">
+                                          <p:stCondLst>
+                                            <p:cond delay="0"/>
+                                          </p:stCondLst>
+                                        </p:cTn>
+                                        <p:tgtEl>
+                                          <p:spTgt spid="5"/>
+                                        </p:tgtEl>
+                                        <p:attrNameLst>
+                                          <p:attrName>style.visibility</p:attrName>
+                                        </p:attrNameLst>
+                                      </p:cBhvr>
+                                      <p:to>
+                                        <p:strVal val="visible"/>
+                                      </p:to>
+                                    </p:set>
+                                    <p:animEffect transition="in" filter="wheel(1)">
+                                      <p:cBhvr>
+                                        <p:cTn id="11" dur="1000"/>
+                                        <p:tgtEl>
+                                          <p:spTgt spid="5"/>
+                                        </p:tgtEl>
+                                      </p:cBhvr>
+                                    </p:animEffect>
+                                  </p:childTnLst>
+                                </p:cTn>
+                              </p:par>
+                            </p:childTnLst>
+                          </p:cTn>
+                        </p:par>
+                        <p:par>
+                          <p:cTn id="12" fill="hold">
+                            <p:stCondLst>
+                              <p:cond delay="2200"/>
+                            </p:stCondLst>
+                            <p:childTnLst>
+                              <p:par>
+                                <p:cTn id="13" presetID="22" presetClass="entr" presetSubtype="8" fill="hold" nodeType="afterEffect">
+                                  <p:stCondLst>
+                                    <p:cond delay="0"/>
+                                  </p:stCondLst>
+                                  <p:childTnLst>
+                                    <p:set>
+                                      <p:cBhvr>
+                                        <p:cTn id="14" dur="1" fill="hold">
+                                          <p:stCondLst>
+                                            <p:cond delay="0"/>
+                                          </p:stCondLst>
+                                        </p:cTn>
+                                        <p:tgtEl>
+                                          <p:spTgt spid="10">
+                                            <p:txEl>
+                                              <p:pRg st="0" end="0"/>
+                                            </p:txEl>
+                                          </p:spTgt>
+                                        </p:tgtEl>
+                                        <p:attrNameLst>
+                                          <p:attrName>style.visibility</p:attrName>
+                                        </p:attrNameLst>
+                                      </p:cBhvr>
+                                      <p:to>
+                                        <p:strVal val="visible"/>
+                                      </p:to>
+                                    </p:set>
+                                    <p:animEffect transition="in" filter="wipe(left)">
+                                      <p:cBhvr>
+                                        <p:cTn id="15" dur="1000"/>
+                                        <p:tgtEl>
+                                          <p:spTgt spid="10">
+                                            <p:txEl>
+                                              <p:pRg st="0" end="0"/>
+                                            </p:txEl>
+                                          </p:spTgt>
+                                        </p:tgtEl>
+                                      </p:cBhvr>
+                                    </p:animEffect>
+                                  </p:childTnLst>
+                                </p:cTn>
+                              </p:par>
+                            </p:childTnLst>
+                          </p:cTn>
+                        </p:par>
+                        <p:par>
+                          <p:cTn id="16" fill="hold">
+                            <p:stCondLst>
+                              <p:cond delay="3200"/>
+                            </p:stCondLst>
+                            <p:childTnLst>
+                              <p:par>
+                                <p:cTn id="17" presetID="22" presetClass="entr" presetSubtype="1" fill="hold" nodeType="afterEffect">
+                                  <p:stCondLst>
+                                    <p:cond delay="0"/>
+                                  </p:stCondLst>
+                                  <p:childTnLst>
+                                    <p:set>
+                                      <p:cBhvr>
+                                        <p:cTn id="18" dur="1" fill="hold">
+                                          <p:stCondLst>
+                                            <p:cond delay="0"/>
+                                          </p:stCondLst>
+                                        </p:cTn>
+                                        <p:tgtEl>
+                                          <p:spTgt spid="9"/>
+                                        </p:tgtEl>
+                                        <p:attrNameLst>
+                                          <p:attrName>style.visibility</p:attrName>
+                                        </p:attrNameLst>
+                                      </p:cBhvr>
+                                      <p:to>
+                                        <p:strVal val="visible"/>
+                                      </p:to>
+                                    </p:set>
+                                    <p:animEffect transition="in" filter="wipe(up)">
+                                      <p:cBhvr>
+                                        <p:cTn id="19" dur="500"/>
+                                        <p:tgtEl>
+                                          <p:spTgt spid="9"/>
+                                        </p:tgtEl>
+                                      </p:cBhvr>
+                                    </p:animEffect>
+                                  </p:childTnLst>
+                                </p:cTn>
+                              </p:par>
+                              <p:par>
+                                <p:cTn id="20" presetID="22" presetClass="entr" presetSubtype="8" fill="hold" grpId="0" nodeType="withEffect">
+                                  <p:stCondLst>
+                                    <p:cond delay="0"/>
+                                  </p:stCondLst>
+                                  <p:childTnLst>
+                                    <p:set>
+                                      <p:cBhvr>
+                                        <p:cTn id="21" dur="1" fill="hold">
+                                          <p:stCondLst>
+                                            <p:cond delay="0"/>
+                                          </p:stCondLst>
+                                        </p:cTn>
+                                        <p:tgtEl>
+                                          <p:spTgt spid="7">
+                                            <p:txEl>
+                                              <p:pRg st="0" end="0"/>
+                                            </p:txEl>
+                                          </p:spTgt>
+                                        </p:tgtEl>
+                                        <p:attrNameLst>
+                                          <p:attrName>style.visibility</p:attrName>
+                                        </p:attrNameLst>
+                                      </p:cBhvr>
+                                      <p:to>
+                                        <p:strVal val="visible"/>
+                                      </p:to>
+                                    </p:set>
+                                    <p:animEffect transition="in" filter="wipe(left)">
+                                      <p:cBhvr>
+                                        <p:cTn id="22" dur="400"/>
+                                        <p:tgtEl>
+                                          <p:spTgt spid="7">
+                                            <p:txEl>
+                                              <p:pRg st="0" end="0"/>
+                                            </p:txEl>
+                                          </p:spTgt>
+                                        </p:tgtEl>
+                                      </p:cBhvr>
+                                    </p:animEffect>
+                                  </p:childTnLst>
+                                </p:cTn>
+                              </p:par>
+                              <p:par>
+                                <p:cTn id="23" presetID="22" presetClass="entr" presetSubtype="8" fill="hold" grpId="0" nodeType="withEffect">
+                                  <p:stCondLst>
+                                    <p:cond delay="0"/>
+                                  </p:stCondLst>
+                                  <p:childTnLst>
+                                    <p:set>
+                                      <p:cBhvr>
+                                        <p:cTn id="24" dur="1" fill="hold">
+                                          <p:stCondLst>
+                                            <p:cond delay="0"/>
+                                          </p:stCondLst>
+                                        </p:cTn>
+                                        <p:tgtEl>
+                                          <p:spTgt spid="7">
+                                            <p:txEl>
+                                              <p:pRg st="1" end="1"/>
+                                            </p:txEl>
+                                          </p:spTgt>
+                                        </p:tgtEl>
+                                        <p:attrNameLst>
+                                          <p:attrName>style.visibility</p:attrName>
+                                        </p:attrNameLst>
+                                      </p:cBhvr>
+                                      <p:to>
+                                        <p:strVal val="visible"/>
+                                      </p:to>
+                                    </p:set>
+                                    <p:animEffect transition="in" filter="wipe(left)">
+                                      <p:cBhvr>
+                                        <p:cTn id="25" dur="400"/>
+                                        <p:tgtEl>
+                                          <p:spTgt spid="7">
+                                            <p:txEl>
+                                              <p:pRg st="1" end="1"/>
+                                            </p:txEl>
+                                          </p:spTgt>
+                                        </p:tgtEl>
+                                      </p:cBhvr>
+                                    </p:animEffect>
+                                  </p:childTnLst>
+                                </p:cTn>
+                              </p:par>
+                              <p:par>
+                                <p:cTn id="26" presetID="47" presetClass="entr" presetSubtype="0" fill="hold" grpId="0" nodeType="withEffect">
+                                  <p:stCondLst>
+                                    <p:cond delay="0"/>
+                                  </p:stCondLst>
+                                  <p:childTnLst>
+                                    <p:set>
+                                      <p:cBhvr>
+                                        <p:cTn id="27" dur="1" fill="hold">
+                                          <p:stCondLst>
+                                            <p:cond delay="0"/>
+                                          </p:stCondLst>
+                                        </p:cTn>
+                                        <p:tgtEl>
+                                          <p:spTgt spid="11"/>
+                                        </p:tgtEl>
+                                        <p:attrNameLst>
+                                          <p:attrName>style.visibility</p:attrName>
+                                        </p:attrNameLst>
+                                      </p:cBhvr>
+                                      <p:to>
+                                        <p:strVal val="visible"/>
+                                      </p:to>
+                                    </p:set>
+                                    <p:animEffect transition="in" filter="fade">
+                                      <p:cBhvr>
+                                        <p:cTn id="28" dur="1000"/>
+                                        <p:tgtEl>
+                                          <p:spTgt spid="11"/>
+                                        </p:tgtEl>
+                                      </p:cBhvr>
+                                    </p:animEffect>
+                                    <p:anim calcmode="lin" valueType="num">
+                                      <p:cBhvr>
+                                        <p:cTn id="29" dur="1000" fill="hold"/>
+                                        <p:tgtEl>
+                                          <p:spTgt spid="11"/>
+                                        </p:tgtEl>
+                                        <p:attrNameLst>
+                                          <p:attrName>ppt_x</p:attrName>
+                                        </p:attrNameLst>
+                                      </p:cBhvr>
+                                      <p:tavLst>
+                                        <p:tav tm="0">
+                                          <p:val>
+                                            <p:strVal val="#ppt_x"/>
+                                          </p:val>
+                                        </p:tav>
+                                        <p:tav tm="100000">
+                                          <p:val>
+                                            <p:strVal val="#ppt_x"/>
+                                          </p:val>
+                                        </p:tav>
+                                      </p:tavLst>
+                                    </p:anim>
+                                    <p:anim calcmode="lin" valueType="num">
+                                      <p:cBhvr>
+                                        <p:cTn id="30" dur="1000" fill="hold"/>
+                                        <p:tgtEl>
+                                          <p:spTgt spid="11"/>
+                                        </p:tgtEl>
+                                        <p:attrNameLst>
+                                          <p:attrName>ppt_y</p:attrName>
+                                        </p:attrNameLst>
+                                      </p:cBhvr>
+                                      <p:tavLst>
+                                        <p:tav tm="0">
+                                          <p:val>
+                                            <p:strVal val="#ppt_y-.1"/>
+                                          </p:val>
+                                        </p:tav>
+                                        <p:tav tm="100000">
+                                          <p:val>
+                                            <p:strVal val="#ppt_y"/>
+                                          </p:val>
+                                        </p:tav>
+                                      </p:tavLst>
+                                    </p:anim>
+                                  </p:childTnLst>
+                                </p:cTn>
+                              </p:par>
+                            </p:childTnLst>
+                          </p:cTn>
+                        </p:par>
+                        <p:par>
+                          <p:cTn id="31" fill="hold">
+                            <p:stCondLst>
+                              <p:cond delay="4200"/>
+                            </p:stCondLst>
+                            <p:childTnLst>
+                              <p:par>
+                                <p:cTn id="32" presetID="22" presetClass="entr" presetSubtype="8" fill="hold" grpId="0" nodeType="afterEffect">
+                                  <p:stCondLst>
+                                    <p:cond delay="0"/>
+                                  </p:stCondLst>
+                                  <p:childTnLst>
+                                    <p:set>
+                                      <p:cBhvr>
+                                        <p:cTn id="33" dur="1" fill="hold">
+                                          <p:stCondLst>
+                                            <p:cond delay="0"/>
+                                          </p:stCondLst>
+                                        </p:cTn>
+                                        <p:tgtEl>
+                                          <p:spTgt spid="12">
+                                            <p:bg/>
+                                          </p:spTgt>
+                                        </p:tgtEl>
+                                        <p:attrNameLst>
+                                          <p:attrName>style.visibility</p:attrName>
+                                        </p:attrNameLst>
+                                      </p:cBhvr>
+                                      <p:to>
+                                        <p:strVal val="visible"/>
+                                      </p:to>
+                                    </p:set>
+                                    <p:animEffect transition="in" filter="wipe(left)">
+                                      <p:cBhvr>
+                                        <p:cTn id="34" dur="1000"/>
+                                        <p:tgtEl>
+                                          <p:spTgt spid="12">
+                                            <p:bg/>
+                                          </p:spTgt>
+                                        </p:tgtEl>
+                                      </p:cBhvr>
+                                    </p:animEffect>
+                                  </p:childTnLst>
+                                </p:cTn>
+                              </p:par>
+                            </p:childTnLst>
+                          </p:cTn>
+                        </p:par>
+                        <p:par>
+                          <p:cTn id="35" fill="hold">
+                            <p:stCondLst>
+                              <p:cond delay="5200"/>
+                            </p:stCondLst>
+                            <p:childTnLst>
+                              <p:par>
+                                <p:cTn id="36" presetID="22" presetClass="entr" presetSubtype="8" fill="hold" grpId="0" nodeType="afterEffect">
+                                  <p:stCondLst>
+                                    <p:cond delay="0"/>
+                                  </p:stCondLst>
+                                  <p:childTnLst>
+                                    <p:set>
+                                      <p:cBhvr>
+                                        <p:cTn id="37" dur="1" fill="hold">
+                                          <p:stCondLst>
+                                            <p:cond delay="0"/>
+                                          </p:stCondLst>
+                                        </p:cTn>
+                                        <p:tgtEl>
+                                          <p:spTgt spid="12">
+                                            <p:txEl>
+                                              <p:pRg st="0" end="0"/>
+                                            </p:txEl>
+                                          </p:spTgt>
+                                        </p:tgtEl>
+                                        <p:attrNameLst>
+                                          <p:attrName>style.visibility</p:attrName>
+                                        </p:attrNameLst>
+                                      </p:cBhvr>
+                                      <p:to>
+                                        <p:strVal val="visible"/>
+                                      </p:to>
+                                    </p:set>
+                                    <p:animEffect transition="in" filter="wipe(left)">
+                                      <p:cBhvr>
+                                        <p:cTn id="38" dur="1000"/>
+                                        <p:tgtEl>
+                                          <p:spTgt spid="12">
+                                            <p:txEl>
+                                              <p:pRg st="0" end="0"/>
+                                            </p:txEl>
+                                          </p:spTgt>
+                                        </p:tgtEl>
+                                      </p:cBhvr>
+                                    </p:animEffect>
+                                  </p:childTnLst>
+                                </p:cTn>
+                              </p:par>
+                            </p:childTnLst>
+                          </p:cTn>
+                        </p:par>
+                        <p:par>
+                          <p:cTn id="39" fill="hold">
+                            <p:stCondLst>
+                              <p:cond delay="6200"/>
+                            </p:stCondLst>
+                            <p:childTnLst>
+                              <p:par>
+                                <p:cTn id="40" presetID="22" presetClass="entr" presetSubtype="8" fill="hold" grpId="0" nodeType="afterEffect">
+                                  <p:stCondLst>
+                                    <p:cond delay="0"/>
+                                  </p:stCondLst>
+                                  <p:childTnLst>
+                                    <p:set>
+                                      <p:cBhvr>
+                                        <p:cTn id="41" dur="1" fill="hold">
+                                          <p:stCondLst>
+                                            <p:cond delay="0"/>
+                                          </p:stCondLst>
+                                        </p:cTn>
+                                        <p:tgtEl>
+                                          <p:spTgt spid="12">
+                                            <p:txEl>
+                                              <p:pRg st="2" end="2"/>
+                                            </p:txEl>
+                                          </p:spTgt>
+                                        </p:tgtEl>
+                                        <p:attrNameLst>
+                                          <p:attrName>style.visibility</p:attrName>
+                                        </p:attrNameLst>
+                                      </p:cBhvr>
+                                      <p:to>
+                                        <p:strVal val="visible"/>
+                                      </p:to>
+                                    </p:set>
+                                    <p:animEffect transition="in" filter="wipe(left)">
+                                      <p:cBhvr>
+                                        <p:cTn id="42" dur="1000"/>
+                                        <p:tgtEl>
+                                          <p:spTgt spid="12">
+                                            <p:txEl>
+                                              <p:pRg st="2" end="2"/>
+                                            </p:txEl>
+                                          </p:spTgt>
+                                        </p:tgtEl>
+                                      </p:cBhvr>
+                                    </p:animEffect>
+                                  </p:childTnLst>
+                                </p:cTn>
+                              </p:par>
+                            </p:childTnLst>
+                          </p:cTn>
+                        </p:par>
+                        <p:par>
+                          <p:cTn id="43" fill="hold">
+                            <p:stCondLst>
+                              <p:cond delay="7200"/>
+                            </p:stCondLst>
+                            <p:childTnLst>
+                              <p:par>
+                                <p:cTn id="44" presetID="22" presetClass="entr" presetSubtype="8" fill="hold" grpId="0" nodeType="afterEffect">
+                                  <p:stCondLst>
+                                    <p:cond delay="0"/>
+                                  </p:stCondLst>
+                                  <p:childTnLst>
+                                    <p:set>
+                                      <p:cBhvr>
+                                        <p:cTn id="45" dur="1" fill="hold">
+                                          <p:stCondLst>
+                                            <p:cond delay="0"/>
+                                          </p:stCondLst>
+                                        </p:cTn>
+                                        <p:tgtEl>
+                                          <p:spTgt spid="12">
+                                            <p:txEl>
+                                              <p:pRg st="3" end="3"/>
+                                            </p:txEl>
+                                          </p:spTgt>
+                                        </p:tgtEl>
+                                        <p:attrNameLst>
+                                          <p:attrName>style.visibility</p:attrName>
+                                        </p:attrNameLst>
+                                      </p:cBhvr>
+                                      <p:to>
+                                        <p:strVal val="visible"/>
+                                      </p:to>
+                                    </p:set>
+                                    <p:animEffect transition="in" filter="wipe(left)">
+                                      <p:cBhvr>
+                                        <p:cTn id="46" dur="1000"/>
+                                        <p:tgtEl>
+                                          <p:spTgt spid="12">
+                                            <p:txEl>
+                                              <p:pRg st="3" end="3"/>
+                                            </p:txEl>
+                                          </p:spTgt>
+                                        </p:tgtEl>
+                                      </p:cBhvr>
+                                    </p:animEffect>
+                                  </p:childTnLst>
+                                </p:cTn>
+                              </p:par>
+                            </p:childTnLst>
+                          </p:cTn>
+                        </p:par>
+                        <p:par>
+                          <p:cTn id="47" fill="hold">
+                            <p:stCondLst>
+                              <p:cond delay="8200"/>
+                            </p:stCondLst>
+                            <p:childTnLst>
+                              <p:par>
+                                <p:cTn id="48" presetID="22" presetClass="entr" presetSubtype="8" fill="hold" grpId="0" nodeType="afterEffect">
+                                  <p:stCondLst>
+                                    <p:cond delay="0"/>
+                                  </p:stCondLst>
+                                  <p:childTnLst>
+                                    <p:set>
+                                      <p:cBhvr>
+                                        <p:cTn id="49" dur="1" fill="hold">
+                                          <p:stCondLst>
+                                            <p:cond delay="0"/>
+                                          </p:stCondLst>
+                                        </p:cTn>
+                                        <p:tgtEl>
+                                          <p:spTgt spid="12">
+                                            <p:txEl>
+                                              <p:pRg st="4" end="4"/>
+                                            </p:txEl>
+                                          </p:spTgt>
+                                        </p:tgtEl>
+                                        <p:attrNameLst>
+                                          <p:attrName>style.visibility</p:attrName>
+                                        </p:attrNameLst>
+                                      </p:cBhvr>
+                                      <p:to>
+                                        <p:strVal val="visible"/>
+                                      </p:to>
+                                    </p:set>
+                                    <p:animEffect transition="in" filter="wipe(left)">
+                                      <p:cBhvr>
+                                        <p:cTn id="50" dur="1000"/>
+                                        <p:tgtEl>
+                                          <p:spTgt spid="12">
+                                            <p:txEl>
+                                              <p:pRg st="4" end="4"/>
+                                            </p:txEl>
+                                          </p:spTgt>
+                                        </p:tgtEl>
+                                      </p:cBhvr>
+                                    </p:animEffect>
+                                  </p:childTnLst>
+                                </p:cTn>
+                              </p:par>
+                            </p:childTnLst>
+                          </p:cTn>
+                        </p:par>
+                        <p:par>
+                          <p:cTn id="51" fill="hold">
+                            <p:stCondLst>
+                              <p:cond delay="9200"/>
+                            </p:stCondLst>
+                            <p:childTnLst>
+                              <p:par>
+                                <p:cTn id="52" presetID="22" presetClass="entr" presetSubtype="8" fill="hold" grpId="0" nodeType="afterEffect">
+                                  <p:stCondLst>
+                                    <p:cond delay="0"/>
+                                  </p:stCondLst>
+                                  <p:childTnLst>
+                                    <p:set>
+                                      <p:cBhvr>
+                                        <p:cTn id="53" dur="1" fill="hold">
+                                          <p:stCondLst>
+                                            <p:cond delay="0"/>
+                                          </p:stCondLst>
+                                        </p:cTn>
+                                        <p:tgtEl>
+                                          <p:spTgt spid="12">
+                                            <p:txEl>
+                                              <p:pRg st="5" end="5"/>
+                                            </p:txEl>
+                                          </p:spTgt>
+                                        </p:tgtEl>
+                                        <p:attrNameLst>
+                                          <p:attrName>style.visibility</p:attrName>
+                                        </p:attrNameLst>
+                                      </p:cBhvr>
+                                      <p:to>
+                                        <p:strVal val="visible"/>
+                                      </p:to>
+                                    </p:set>
+                                    <p:animEffect transition="in" filter="wipe(left)">
+                                      <p:cBhvr>
+                                        <p:cTn id="54" dur="1000"/>
+                                        <p:tgtEl>
+                                          <p:spTgt spid="12">
+                                            <p:txEl>
+                                              <p:pRg st="5" end="5"/>
+                                            </p:txEl>
+                                          </p:spTgt>
+                                        </p:tgtEl>
+                                      </p:cBhvr>
+                                    </p:animEffect>
+                                  </p:childTnLst>
+                                </p:cTn>
+                              </p:par>
+                            </p:childTnLst>
+                          </p:cTn>
+                        </p:par>
+                        <p:par>
+                          <p:cTn id="55" fill="hold">
+                            <p:stCondLst>
+                              <p:cond delay="10200"/>
+                            </p:stCondLst>
+                            <p:childTnLst>
+                              <p:par>
+                                <p:cTn id="56" presetID="22" presetClass="entr" presetSubtype="8" fill="hold" grpId="0" nodeType="afterEffect">
+                                  <p:stCondLst>
+                                    <p:cond delay="0"/>
+                                  </p:stCondLst>
+                                  <p:childTnLst>
+                                    <p:set>
+                                      <p:cBhvr>
+                                        <p:cTn id="57" dur="1" fill="hold">
+                                          <p:stCondLst>
+                                            <p:cond delay="0"/>
+                                          </p:stCondLst>
+                                        </p:cTn>
+                                        <p:tgtEl>
+                                          <p:spTgt spid="12">
+                                            <p:txEl>
+                                              <p:pRg st="6" end="6"/>
+                                            </p:txEl>
+                                          </p:spTgt>
+                                        </p:tgtEl>
+                                        <p:attrNameLst>
+                                          <p:attrName>style.visibility</p:attrName>
+                                        </p:attrNameLst>
+                                      </p:cBhvr>
+                                      <p:to>
+                                        <p:strVal val="visible"/>
+                                      </p:to>
+                                    </p:set>
+                                    <p:animEffect transition="in" filter="wipe(left)">
+                                      <p:cBhvr>
+                                        <p:cTn id="58" dur="1000"/>
+                                        <p:tgtEl>
+                                          <p:spTgt spid="12">
+                                            <p:txEl>
+                                              <p:pRg st="6" end="6"/>
+                                            </p:txEl>
+                                          </p:spTgt>
+                                        </p:tgtEl>
+                                      </p:cBhvr>
+                                    </p:animEffect>
+                                  </p:childTnLst>
+                                </p:cTn>
+                              </p:par>
+                            </p:childTnLst>
+                          </p:cTn>
+                        </p:par>
+                        <p:par>
+                          <p:cTn id="59" fill="hold">
+                            <p:stCondLst>
+                              <p:cond delay="11200"/>
+                            </p:stCondLst>
+                            <p:childTnLst>
+                              <p:par>
+                                <p:cTn id="60" presetID="22" presetClass="entr" presetSubtype="8" fill="hold" grpId="0" nodeType="afterEffect">
+                                  <p:stCondLst>
+                                    <p:cond delay="0"/>
+                                  </p:stCondLst>
+                                  <p:childTnLst>
+                                    <p:set>
+                                      <p:cBhvr>
+                                        <p:cTn id="61" dur="1" fill="hold">
+                                          <p:stCondLst>
+                                            <p:cond delay="0"/>
+                                          </p:stCondLst>
+                                        </p:cTn>
+                                        <p:tgtEl>
+                                          <p:spTgt spid="12">
+                                            <p:txEl>
+                                              <p:pRg st="7" end="7"/>
+                                            </p:txEl>
+                                          </p:spTgt>
+                                        </p:tgtEl>
+                                        <p:attrNameLst>
+                                          <p:attrName>style.visibility</p:attrName>
+                                        </p:attrNameLst>
+                                      </p:cBhvr>
+                                      <p:to>
+                                        <p:strVal val="visible"/>
+                                      </p:to>
+                                    </p:set>
+                                    <p:animEffect transition="in" filter="wipe(left)">
+                                      <p:cBhvr>
+                                        <p:cTn id="62" dur="1000"/>
+                                        <p:tgtEl>
+                                          <p:spTgt spid="12">
+                                            <p:txEl>
+                                              <p:pRg st="7" end="7"/>
+                                            </p:txEl>
+                                          </p:spTgt>
+                                        </p:tgtEl>
+                                      </p:cBhvr>
+                                    </p:animEffect>
+                                  </p:childTnLst>
+                                </p:cTn>
+                              </p:par>
+                            </p:childTnLst>
+                          </p:cTn>
+                        </p:par>
+                        <p:par>
+                          <p:cTn id="63" fill="hold">
+                            <p:stCondLst>
+                              <p:cond delay="12200"/>
+                            </p:stCondLst>
+                            <p:childTnLst>
+                              <p:par>
+                                <p:cTn id="64" presetID="22" presetClass="entr" presetSubtype="8" fill="hold" grpId="0" nodeType="afterEffect">
+                                  <p:stCondLst>
+                                    <p:cond delay="0"/>
+                                  </p:stCondLst>
+                                  <p:childTnLst>
+                                    <p:set>
+                                      <p:cBhvr>
+                                        <p:cTn id="65" dur="1" fill="hold">
+                                          <p:stCondLst>
+                                            <p:cond delay="0"/>
+                                          </p:stCondLst>
+                                        </p:cTn>
+                                        <p:tgtEl>
+                                          <p:spTgt spid="12">
+                                            <p:txEl>
+                                              <p:pRg st="8" end="8"/>
+                                            </p:txEl>
+                                          </p:spTgt>
+                                        </p:tgtEl>
+                                        <p:attrNameLst>
+                                          <p:attrName>style.visibility</p:attrName>
+                                        </p:attrNameLst>
+                                      </p:cBhvr>
+                                      <p:to>
+                                        <p:strVal val="visible"/>
+                                      </p:to>
+                                    </p:set>
+                                    <p:animEffect transition="in" filter="wipe(left)">
+                                      <p:cBhvr>
+                                        <p:cTn id="66" dur="1000"/>
+                                        <p:tgtEl>
+                                          <p:spTgt spid="12">
+                                            <p:txEl>
+                                              <p:pRg st="8" end="8"/>
+                                            </p:txEl>
+                                          </p:spTgt>
+                                        </p:tgtEl>
+                                      </p:cBhvr>
+                                    </p:animEffect>
+                                  </p:childTnLst>
+                                </p:cTn>
+                              </p:par>
+                            </p:childTnLst>
+                          </p:cTn>
+                        </p:par>
+                      </p:childTnLst>
+                    </p:cTn>
+                  </p:par>
+                </p:childTnLst>
+              </p:cTn>
+              <p:prevCondLst>
+                <p:cond evt="onPrev" delay="0">
+                  <p:tgtEl>
+                    <p:sldTgt/>
+                  </p:tgtEl>
+                </p:cond>
+              </p:prevCondLst>
+              <p:nextCondLst>
+                <p:cond evt="onNext" delay="0">
+                  <p:tgtEl>
+                    <p:sldTgt/>
+                  </p:tgtEl>
+                </p:cond>
+              </p:nextCondLst>
+            </p:seq>
+          </p:childTnLst>
+        </p:cTn>
+      </p:par>
+    </p:tnLst>
+    <p:bldLst>
+      <p:bldP spid="5" grpId="0" animBg="1"/>
+      <p:bldP spid="6" grpId="0" animBg="1"/>
+      <p:bldP spid="7" grpId="0" uiExpand="1" build="p"/>
+      <p:bldP spid="11" grpId="0"/>
+      <p:bldP spid="12" grpId="0" build="p" animBg="1"/>
+    </p:bldLst>
+  </p:timing>
+</p:sld>
+</file>
+
+<file path=ppt/slides/slide2.xml><?xml version="1.0" encoding="utf-8"?>
+<p:sld xmlns:a="http://schemas.openxmlformats.org/drawingml/2006/main" xmlns:r="http://schemas.openxmlformats.org/officeDocument/2006/relationships" xmlns:p="http://schemas.openxmlformats.org/presentationml/2006/main">
+  <p:cSld>
+    <p:spTree>
+      <p:nvGrpSpPr>
+        <p:cNvPr id="1" name=""/>
+        <p:cNvGrpSpPr/>
+        <p:nvPr/>
+      </p:nvGrpSpPr>
+      <p:grpSpPr>
+        <a:xfrm>
+          <a:off x="0" y="0"/>
+          <a:ext cx="0" cy="0"/>
+          <a:chOff x="0" y="0"/>
+          <a:chExt cx="0" cy="0"/>
+        </a:xfrm>
+      </p:grpSpPr>
+      <p:sp>
+        <p:nvSpPr>
+          <p:cNvPr id="5" name="Rectángulo 4">
+            <a:extLst>
+              <a:ext uri="{FF2B5EF4-FFF2-40B4-BE49-F238E27FC236}">
+                <a16:creationId xmlns:a16="http://schemas.microsoft.com/office/drawing/2014/main" id="{094A6736-35AD-441B-9AE8-0B811CA4A999}"/>
+              </a:ext>
+            </a:extLst>
+          </p:cNvPr>
+          <p:cNvSpPr/>
+          <p:nvPr/>
+        </p:nvSpPr>
+        <p:spPr>
+          <a:xfrm>
+            <a:off x="-1" y="0"/>
+            <a:ext cx="9144001" cy="6858000"/>
+          </a:xfrm>
+          <a:prstGeom prst="rect">
+            <a:avLst/>
+          </a:prstGeom>
+          <a:blipFill>
+            <a:blip r:embed="rId2"/>
+            <a:stretch>
+              <a:fillRect b="-8452"/>
+            </a:stretch>
+          </a:blipFill>
+          <a:ln>
+            <a:noFill/>
+          </a:ln>
+        </p:spPr>
+        <p:style>
+          <a:lnRef idx="2">
+            <a:schemeClr val="accent1">
+              <a:shade val="50000"/>
+            </a:schemeClr>
+          </a:lnRef>
+          <a:fillRef idx="1">
+            <a:schemeClr val="accent1"/>
+          </a:fillRef>
+          <a:effectRef idx="0">
+            <a:schemeClr val="accent1"/>
+          </a:effectRef>
+          <a:fontRef idx="minor">
+            <a:schemeClr val="lt1"/>
+          </a:fontRef>
+        </p:style>
+        <p:txBody>
+          <a:bodyPr rtlCol="0" anchor="ctr"/>
+          <a:lstStyle/>
+          <a:p>
+            <a:br>
+              <a:rPr lang="es-ES" sz="1500" dirty="0">
+                <a:solidFill>
+                  <a:schemeClr val="tx1"/>
+                </a:solidFill>
+                <a:latin typeface="Times New Roman" panose="02020603050405020304" pitchFamily="18" charset="0"/>
+              </a:rPr>
+            </a:br>
+            <a:endParaRPr lang="es-CO" sz="1500" u="sng" dirty="0">
+              <a:solidFill>
+                <a:schemeClr val="tx1"/>
+              </a:solidFill>
+            </a:endParaRPr>
+          </a:p>
+        </p:txBody>
+      </p:sp>
+      <p:sp>
+        <p:nvSpPr>
+          <p:cNvPr id="6" name="Rectángulo 5">
+            <a:extLst>
+              <a:ext uri="{FF2B5EF4-FFF2-40B4-BE49-F238E27FC236}">
+                <a16:creationId xmlns:a16="http://schemas.microsoft.com/office/drawing/2014/main" id="{1D7BAA42-1A8A-43C8-B209-D1AFAA845598}"/>
+              </a:ext>
+            </a:extLst>
+          </p:cNvPr>
+          <p:cNvSpPr/>
+          <p:nvPr/>
+        </p:nvSpPr>
+        <p:spPr>
+          <a:xfrm>
+            <a:off x="-2" y="0"/>
+            <a:ext cx="9144001" cy="6858000"/>
+          </a:xfrm>
+          <a:prstGeom prst="rect">
+            <a:avLst/>
+          </a:prstGeom>
+          <a:gradFill flip="none" rotWithShape="1">
+            <a:gsLst>
+              <a:gs pos="0">
+                <a:schemeClr val="accent1">
+                  <a:lumMod val="0"/>
+                  <a:lumOff val="100000"/>
+                  <a:alpha val="60000"/>
+                </a:schemeClr>
+              </a:gs>
+              <a:gs pos="35000">
+                <a:schemeClr val="accent1">
+                  <a:lumMod val="0"/>
+                  <a:lumOff val="100000"/>
+                  <a:alpha val="96000"/>
+                </a:schemeClr>
+              </a:gs>
+              <a:gs pos="100000">
+                <a:schemeClr val="accent1">
+                  <a:lumMod val="100000"/>
+                  <a:alpha val="80000"/>
+                </a:schemeClr>
+              </a:gs>
+            </a:gsLst>
+            <a:path path="circle">
+              <a:fillToRect l="50000" t="-80000" r="50000" b="180000"/>
+            </a:path>
+            <a:tileRect/>
+          </a:gradFill>
+          <a:ln>
+            <a:noFill/>
+          </a:ln>
+        </p:spPr>
+        <p:style>
+          <a:lnRef idx="2">
+            <a:schemeClr val="accent1">
+              <a:shade val="50000"/>
+            </a:schemeClr>
+          </a:lnRef>
+          <a:fillRef idx="1">
+            <a:schemeClr val="accent1"/>
+          </a:fillRef>
+          <a:effectRef idx="0">
+            <a:schemeClr val="accent1"/>
+          </a:effectRef>
+          <a:fontRef idx="minor">
+            <a:schemeClr val="lt1"/>
+          </a:fontRef>
+        </p:style>
+        <p:txBody>
+          <a:bodyPr rtlCol="0" anchor="ctr"/>
+          <a:lstStyle/>
+          <a:p>
+            <a:br>
+              <a:rPr lang="es-ES" sz="1500" u="sng" dirty="0">
+                <a:solidFill>
+                  <a:schemeClr val="tx1"/>
+                </a:solidFill>
+                <a:latin typeface="Times New Roman" panose="02020603050405020304" pitchFamily="18" charset="0"/>
+              </a:rPr>
+            </a:br>
+            <a:endParaRPr lang="es-CO" sz="1500" u="sng" dirty="0">
+              <a:solidFill>
+                <a:schemeClr val="tx1"/>
+              </a:solidFill>
+            </a:endParaRPr>
+          </a:p>
+        </p:txBody>
+      </p:sp>
+    </p:spTree>
+    <p:extLst>
+      <p:ext uri="{BB962C8B-B14F-4D97-AF65-F5344CB8AC3E}">
+        <p14:creationId xmlns:p14="http://schemas.microsoft.com/office/powerpoint/2010/main" val="226881563"/>
+      </p:ext>
+    </p:extLst>
+  </p:cSld>
+  <p:clrMapOvr>
+    <a:masterClrMapping/>
+  </p:clrMapOvr>
+  <p:transition spd="slow">
+    <p:wipe dir="r"/>
+  </p:transition>
 </p:sld>
 </file>
 

</xml_diff>